<commit_message>
simple version of presentation with general flow
</commit_message>
<xml_diff>
--- a/Presentation.pptx
+++ b/Presentation.pptx
@@ -4,17 +4,25 @@
   <p:sldMasterIdLst>
     <p:sldMasterId id="2147483648" r:id="rId1"/>
   </p:sldMasterIdLst>
+  <p:notesMasterIdLst>
+    <p:notesMasterId r:id="rId17"/>
+  </p:notesMasterIdLst>
   <p:sldIdLst>
     <p:sldId id="256" r:id="rId2"/>
     <p:sldId id="257" r:id="rId3"/>
-    <p:sldId id="258" r:id="rId4"/>
-    <p:sldId id="259" r:id="rId5"/>
-    <p:sldId id="263" r:id="rId6"/>
-    <p:sldId id="260" r:id="rId7"/>
-    <p:sldId id="261" r:id="rId8"/>
-    <p:sldId id="262" r:id="rId9"/>
-    <p:sldId id="264" r:id="rId10"/>
-    <p:sldId id="265" r:id="rId11"/>
+    <p:sldId id="266" r:id="rId4"/>
+    <p:sldId id="267" r:id="rId5"/>
+    <p:sldId id="268" r:id="rId6"/>
+    <p:sldId id="258" r:id="rId7"/>
+    <p:sldId id="259" r:id="rId8"/>
+    <p:sldId id="263" r:id="rId9"/>
+    <p:sldId id="269" r:id="rId10"/>
+    <p:sldId id="271" r:id="rId11"/>
+    <p:sldId id="260" r:id="rId12"/>
+    <p:sldId id="261" r:id="rId13"/>
+    <p:sldId id="264" r:id="rId14"/>
+    <p:sldId id="265" r:id="rId15"/>
+    <p:sldId id="270" r:id="rId16"/>
   </p:sldIdLst>
   <p:sldSz cx="12192000" cy="6858000"/>
   <p:notesSz cx="6858000" cy="9144000"/>
@@ -113,7 +121,446 @@
       </a:defRPr>
     </a:lvl9pPr>
   </p:defaultTextStyle>
+  <p:extLst>
+    <p:ext uri="{EFAFB233-063F-42B5-8137-9DF3F51BA10A}">
+      <p15:sldGuideLst xmlns:p15="http://schemas.microsoft.com/office/powerpoint/2012/main"/>
+    </p:ext>
+  </p:extLst>
 </p:presentation>
+</file>
+
+<file path=ppt/notesMasters/notesMaster1.xml><?xml version="1.0" encoding="utf-8"?>
+<p:notesMaster xmlns:a="http://schemas.openxmlformats.org/drawingml/2006/main" xmlns:r="http://schemas.openxmlformats.org/officeDocument/2006/relationships" xmlns:p="http://schemas.openxmlformats.org/presentationml/2006/main">
+  <p:cSld>
+    <p:bg>
+      <p:bgRef idx="1001">
+        <a:schemeClr val="bg1"/>
+      </p:bgRef>
+    </p:bg>
+    <p:spTree>
+      <p:nvGrpSpPr>
+        <p:cNvPr id="1" name=""/>
+        <p:cNvGrpSpPr/>
+        <p:nvPr/>
+      </p:nvGrpSpPr>
+      <p:grpSpPr>
+        <a:xfrm>
+          <a:off x="0" y="0"/>
+          <a:ext cx="0" cy="0"/>
+          <a:chOff x="0" y="0"/>
+          <a:chExt cx="0" cy="0"/>
+        </a:xfrm>
+      </p:grpSpPr>
+      <p:sp>
+        <p:nvSpPr>
+          <p:cNvPr id="2" name="Espace réservé de l'en-tête 1"/>
+          <p:cNvSpPr>
+            <a:spLocks noGrp="1"/>
+          </p:cNvSpPr>
+          <p:nvPr>
+            <p:ph type="hdr" sz="quarter"/>
+          </p:nvPr>
+        </p:nvSpPr>
+        <p:spPr>
+          <a:xfrm>
+            <a:off x="0" y="0"/>
+            <a:ext cx="2971800" cy="458788"/>
+          </a:xfrm>
+          <a:prstGeom prst="rect">
+            <a:avLst/>
+          </a:prstGeom>
+        </p:spPr>
+        <p:txBody>
+          <a:bodyPr vert="horz" lIns="91440" tIns="45720" rIns="91440" bIns="45720" rtlCol="0"/>
+          <a:lstStyle>
+            <a:lvl1pPr algn="l">
+              <a:defRPr sz="1200"/>
+            </a:lvl1pPr>
+          </a:lstStyle>
+          <a:p>
+            <a:endParaRPr lang="en-GB"/>
+          </a:p>
+        </p:txBody>
+      </p:sp>
+      <p:sp>
+        <p:nvSpPr>
+          <p:cNvPr id="3" name="Espace réservé de la date 2"/>
+          <p:cNvSpPr>
+            <a:spLocks noGrp="1"/>
+          </p:cNvSpPr>
+          <p:nvPr>
+            <p:ph type="dt" idx="1"/>
+          </p:nvPr>
+        </p:nvSpPr>
+        <p:spPr>
+          <a:xfrm>
+            <a:off x="3884613" y="0"/>
+            <a:ext cx="2971800" cy="458788"/>
+          </a:xfrm>
+          <a:prstGeom prst="rect">
+            <a:avLst/>
+          </a:prstGeom>
+        </p:spPr>
+        <p:txBody>
+          <a:bodyPr vert="horz" lIns="91440" tIns="45720" rIns="91440" bIns="45720" rtlCol="0"/>
+          <a:lstStyle>
+            <a:lvl1pPr algn="r">
+              <a:defRPr sz="1200"/>
+            </a:lvl1pPr>
+          </a:lstStyle>
+          <a:p>
+            <a:fld id="{B55F56A9-B49E-E84B-AB2B-D08CED4A1ED4}" type="datetimeFigureOut">
+              <a:rPr lang="en-GB" smtClean="0"/>
+              <a:t>10/01/2023</a:t>
+            </a:fld>
+            <a:endParaRPr lang="en-GB"/>
+          </a:p>
+        </p:txBody>
+      </p:sp>
+      <p:sp>
+        <p:nvSpPr>
+          <p:cNvPr id="4" name="Espace réservé de l'image des diapositives 3"/>
+          <p:cNvSpPr>
+            <a:spLocks noGrp="1" noRot="1" noChangeAspect="1"/>
+          </p:cNvSpPr>
+          <p:nvPr>
+            <p:ph type="sldImg" idx="2"/>
+          </p:nvPr>
+        </p:nvSpPr>
+        <p:spPr>
+          <a:xfrm>
+            <a:off x="685800" y="1143000"/>
+            <a:ext cx="5486400" cy="3086100"/>
+          </a:xfrm>
+          <a:prstGeom prst="rect">
+            <a:avLst/>
+          </a:prstGeom>
+          <a:noFill/>
+          <a:ln w="12700">
+            <a:solidFill>
+              <a:prstClr val="black"/>
+            </a:solidFill>
+          </a:ln>
+        </p:spPr>
+        <p:txBody>
+          <a:bodyPr vert="horz" lIns="91440" tIns="45720" rIns="91440" bIns="45720" rtlCol="0" anchor="ctr"/>
+          <a:lstStyle/>
+          <a:p>
+            <a:endParaRPr lang="en-GB"/>
+          </a:p>
+        </p:txBody>
+      </p:sp>
+      <p:sp>
+        <p:nvSpPr>
+          <p:cNvPr id="5" name="Espace réservé des notes 4"/>
+          <p:cNvSpPr>
+            <a:spLocks noGrp="1"/>
+          </p:cNvSpPr>
+          <p:nvPr>
+            <p:ph type="body" sz="quarter" idx="3"/>
+          </p:nvPr>
+        </p:nvSpPr>
+        <p:spPr>
+          <a:xfrm>
+            <a:off x="685800" y="4400550"/>
+            <a:ext cx="5486400" cy="3600450"/>
+          </a:xfrm>
+          <a:prstGeom prst="rect">
+            <a:avLst/>
+          </a:prstGeom>
+        </p:spPr>
+        <p:txBody>
+          <a:bodyPr vert="horz" lIns="91440" tIns="45720" rIns="91440" bIns="45720" rtlCol="0"/>
+          <a:lstStyle/>
+          <a:p>
+            <a:pPr lvl="0"/>
+            <a:r>
+              <a:rPr lang="fr-FR"/>
+              <a:t>Cliquez pour modifier les styles du texte du masque</a:t>
+            </a:r>
+          </a:p>
+          <a:p>
+            <a:pPr lvl="1"/>
+            <a:r>
+              <a:rPr lang="fr-FR"/>
+              <a:t>Deuxième niveau</a:t>
+            </a:r>
+          </a:p>
+          <a:p>
+            <a:pPr lvl="2"/>
+            <a:r>
+              <a:rPr lang="fr-FR"/>
+              <a:t>Troisième niveau</a:t>
+            </a:r>
+          </a:p>
+          <a:p>
+            <a:pPr lvl="3"/>
+            <a:r>
+              <a:rPr lang="fr-FR"/>
+              <a:t>Quatrième niveau</a:t>
+            </a:r>
+          </a:p>
+          <a:p>
+            <a:pPr lvl="4"/>
+            <a:r>
+              <a:rPr lang="fr-FR"/>
+              <a:t>Cinquième niveau</a:t>
+            </a:r>
+            <a:endParaRPr lang="en-GB"/>
+          </a:p>
+        </p:txBody>
+      </p:sp>
+      <p:sp>
+        <p:nvSpPr>
+          <p:cNvPr id="6" name="Espace réservé du pied de page 5"/>
+          <p:cNvSpPr>
+            <a:spLocks noGrp="1"/>
+          </p:cNvSpPr>
+          <p:nvPr>
+            <p:ph type="ftr" sz="quarter" idx="4"/>
+          </p:nvPr>
+        </p:nvSpPr>
+        <p:spPr>
+          <a:xfrm>
+            <a:off x="0" y="8685213"/>
+            <a:ext cx="2971800" cy="458787"/>
+          </a:xfrm>
+          <a:prstGeom prst="rect">
+            <a:avLst/>
+          </a:prstGeom>
+        </p:spPr>
+        <p:txBody>
+          <a:bodyPr vert="horz" lIns="91440" tIns="45720" rIns="91440" bIns="45720" rtlCol="0" anchor="b"/>
+          <a:lstStyle>
+            <a:lvl1pPr algn="l">
+              <a:defRPr sz="1200"/>
+            </a:lvl1pPr>
+          </a:lstStyle>
+          <a:p>
+            <a:endParaRPr lang="en-GB"/>
+          </a:p>
+        </p:txBody>
+      </p:sp>
+      <p:sp>
+        <p:nvSpPr>
+          <p:cNvPr id="7" name="Espace réservé du numéro de diapositive 6"/>
+          <p:cNvSpPr>
+            <a:spLocks noGrp="1"/>
+          </p:cNvSpPr>
+          <p:nvPr>
+            <p:ph type="sldNum" sz="quarter" idx="5"/>
+          </p:nvPr>
+        </p:nvSpPr>
+        <p:spPr>
+          <a:xfrm>
+            <a:off x="3884613" y="8685213"/>
+            <a:ext cx="2971800" cy="458787"/>
+          </a:xfrm>
+          <a:prstGeom prst="rect">
+            <a:avLst/>
+          </a:prstGeom>
+        </p:spPr>
+        <p:txBody>
+          <a:bodyPr vert="horz" lIns="91440" tIns="45720" rIns="91440" bIns="45720" rtlCol="0" anchor="b"/>
+          <a:lstStyle>
+            <a:lvl1pPr algn="r">
+              <a:defRPr sz="1200"/>
+            </a:lvl1pPr>
+          </a:lstStyle>
+          <a:p>
+            <a:fld id="{E9A7FCD5-8ACB-0648-BD4B-FC3C1340ED67}" type="slidenum">
+              <a:rPr lang="en-GB" smtClean="0"/>
+              <a:t>‹N°›</a:t>
+            </a:fld>
+            <a:endParaRPr lang="en-GB"/>
+          </a:p>
+        </p:txBody>
+      </p:sp>
+    </p:spTree>
+    <p:extLst>
+      <p:ext uri="{BB962C8B-B14F-4D97-AF65-F5344CB8AC3E}">
+        <p14:creationId xmlns:p14="http://schemas.microsoft.com/office/powerpoint/2010/main" val="1547343105"/>
+      </p:ext>
+    </p:extLst>
+  </p:cSld>
+  <p:clrMap bg1="lt1" tx1="dk1" bg2="lt2" tx2="dk2" accent1="accent1" accent2="accent2" accent3="accent3" accent4="accent4" accent5="accent5" accent6="accent6" hlink="hlink" folHlink="folHlink"/>
+  <p:notesStyle>
+    <a:lvl1pPr marL="0" algn="l" defTabSz="914400" rtl="0" eaLnBrk="1" latinLnBrk="0" hangingPunct="1">
+      <a:defRPr sz="1200" kern="1200">
+        <a:solidFill>
+          <a:schemeClr val="tx1"/>
+        </a:solidFill>
+        <a:latin typeface="+mn-lt"/>
+        <a:ea typeface="+mn-ea"/>
+        <a:cs typeface="+mn-cs"/>
+      </a:defRPr>
+    </a:lvl1pPr>
+    <a:lvl2pPr marL="457200" algn="l" defTabSz="914400" rtl="0" eaLnBrk="1" latinLnBrk="0" hangingPunct="1">
+      <a:defRPr sz="1200" kern="1200">
+        <a:solidFill>
+          <a:schemeClr val="tx1"/>
+        </a:solidFill>
+        <a:latin typeface="+mn-lt"/>
+        <a:ea typeface="+mn-ea"/>
+        <a:cs typeface="+mn-cs"/>
+      </a:defRPr>
+    </a:lvl2pPr>
+    <a:lvl3pPr marL="914400" algn="l" defTabSz="914400" rtl="0" eaLnBrk="1" latinLnBrk="0" hangingPunct="1">
+      <a:defRPr sz="1200" kern="1200">
+        <a:solidFill>
+          <a:schemeClr val="tx1"/>
+        </a:solidFill>
+        <a:latin typeface="+mn-lt"/>
+        <a:ea typeface="+mn-ea"/>
+        <a:cs typeface="+mn-cs"/>
+      </a:defRPr>
+    </a:lvl3pPr>
+    <a:lvl4pPr marL="1371600" algn="l" defTabSz="914400" rtl="0" eaLnBrk="1" latinLnBrk="0" hangingPunct="1">
+      <a:defRPr sz="1200" kern="1200">
+        <a:solidFill>
+          <a:schemeClr val="tx1"/>
+        </a:solidFill>
+        <a:latin typeface="+mn-lt"/>
+        <a:ea typeface="+mn-ea"/>
+        <a:cs typeface="+mn-cs"/>
+      </a:defRPr>
+    </a:lvl4pPr>
+    <a:lvl5pPr marL="1828800" algn="l" defTabSz="914400" rtl="0" eaLnBrk="1" latinLnBrk="0" hangingPunct="1">
+      <a:defRPr sz="1200" kern="1200">
+        <a:solidFill>
+          <a:schemeClr val="tx1"/>
+        </a:solidFill>
+        <a:latin typeface="+mn-lt"/>
+        <a:ea typeface="+mn-ea"/>
+        <a:cs typeface="+mn-cs"/>
+      </a:defRPr>
+    </a:lvl5pPr>
+    <a:lvl6pPr marL="2286000" algn="l" defTabSz="914400" rtl="0" eaLnBrk="1" latinLnBrk="0" hangingPunct="1">
+      <a:defRPr sz="1200" kern="1200">
+        <a:solidFill>
+          <a:schemeClr val="tx1"/>
+        </a:solidFill>
+        <a:latin typeface="+mn-lt"/>
+        <a:ea typeface="+mn-ea"/>
+        <a:cs typeface="+mn-cs"/>
+      </a:defRPr>
+    </a:lvl6pPr>
+    <a:lvl7pPr marL="2743200" algn="l" defTabSz="914400" rtl="0" eaLnBrk="1" latinLnBrk="0" hangingPunct="1">
+      <a:defRPr sz="1200" kern="1200">
+        <a:solidFill>
+          <a:schemeClr val="tx1"/>
+        </a:solidFill>
+        <a:latin typeface="+mn-lt"/>
+        <a:ea typeface="+mn-ea"/>
+        <a:cs typeface="+mn-cs"/>
+      </a:defRPr>
+    </a:lvl7pPr>
+    <a:lvl8pPr marL="3200400" algn="l" defTabSz="914400" rtl="0" eaLnBrk="1" latinLnBrk="0" hangingPunct="1">
+      <a:defRPr sz="1200" kern="1200">
+        <a:solidFill>
+          <a:schemeClr val="tx1"/>
+        </a:solidFill>
+        <a:latin typeface="+mn-lt"/>
+        <a:ea typeface="+mn-ea"/>
+        <a:cs typeface="+mn-cs"/>
+      </a:defRPr>
+    </a:lvl8pPr>
+    <a:lvl9pPr marL="3657600" algn="l" defTabSz="914400" rtl="0" eaLnBrk="1" latinLnBrk="0" hangingPunct="1">
+      <a:defRPr sz="1200" kern="1200">
+        <a:solidFill>
+          <a:schemeClr val="tx1"/>
+        </a:solidFill>
+        <a:latin typeface="+mn-lt"/>
+        <a:ea typeface="+mn-ea"/>
+        <a:cs typeface="+mn-cs"/>
+      </a:defRPr>
+    </a:lvl9pPr>
+  </p:notesStyle>
+</p:notesMaster>
+</file>
+
+<file path=ppt/notesSlides/notesSlide1.xml><?xml version="1.0" encoding="utf-8"?>
+<p:notes xmlns:a="http://schemas.openxmlformats.org/drawingml/2006/main" xmlns:r="http://schemas.openxmlformats.org/officeDocument/2006/relationships" xmlns:p="http://schemas.openxmlformats.org/presentationml/2006/main">
+  <p:cSld>
+    <p:spTree>
+      <p:nvGrpSpPr>
+        <p:cNvPr id="1" name=""/>
+        <p:cNvGrpSpPr/>
+        <p:nvPr/>
+      </p:nvGrpSpPr>
+      <p:grpSpPr>
+        <a:xfrm>
+          <a:off x="0" y="0"/>
+          <a:ext cx="0" cy="0"/>
+          <a:chOff x="0" y="0"/>
+          <a:chExt cx="0" cy="0"/>
+        </a:xfrm>
+      </p:grpSpPr>
+      <p:sp>
+        <p:nvSpPr>
+          <p:cNvPr id="2" name="Espace réservé de l'image des diapositives 1"/>
+          <p:cNvSpPr>
+            <a:spLocks noGrp="1" noRot="1" noChangeAspect="1"/>
+          </p:cNvSpPr>
+          <p:nvPr>
+            <p:ph type="sldImg"/>
+          </p:nvPr>
+        </p:nvSpPr>
+        <p:spPr/>
+      </p:sp>
+      <p:sp>
+        <p:nvSpPr>
+          <p:cNvPr id="3" name="Espace réservé des notes 2"/>
+          <p:cNvSpPr>
+            <a:spLocks noGrp="1"/>
+          </p:cNvSpPr>
+          <p:nvPr>
+            <p:ph type="body" idx="1"/>
+          </p:nvPr>
+        </p:nvSpPr>
+        <p:spPr/>
+        <p:txBody>
+          <a:bodyPr/>
+          <a:lstStyle/>
+          <a:p>
+            <a:endParaRPr lang="en-GB" dirty="0"/>
+          </a:p>
+        </p:txBody>
+      </p:sp>
+      <p:sp>
+        <p:nvSpPr>
+          <p:cNvPr id="4" name="Espace réservé du numéro de diapositive 3"/>
+          <p:cNvSpPr>
+            <a:spLocks noGrp="1"/>
+          </p:cNvSpPr>
+          <p:nvPr>
+            <p:ph type="sldNum" sz="quarter" idx="5"/>
+          </p:nvPr>
+        </p:nvSpPr>
+        <p:spPr/>
+        <p:txBody>
+          <a:bodyPr/>
+          <a:lstStyle/>
+          <a:p>
+            <a:fld id="{E9A7FCD5-8ACB-0648-BD4B-FC3C1340ED67}" type="slidenum">
+              <a:rPr lang="en-GB" smtClean="0"/>
+              <a:t>8</a:t>
+            </a:fld>
+            <a:endParaRPr lang="en-GB"/>
+          </a:p>
+        </p:txBody>
+      </p:sp>
+    </p:spTree>
+    <p:extLst>
+      <p:ext uri="{BB962C8B-B14F-4D97-AF65-F5344CB8AC3E}">
+        <p14:creationId xmlns:p14="http://schemas.microsoft.com/office/powerpoint/2010/main" val="2909526473"/>
+      </p:ext>
+    </p:extLst>
+  </p:cSld>
+  <p:clrMapOvr>
+    <a:masterClrMapping/>
+  </p:clrMapOvr>
+</p:notes>
 </file>
 
 <file path=ppt/slideLayouts/slideLayout1.xml><?xml version="1.0" encoding="utf-8"?>
@@ -263,7 +710,7 @@
           <a:p>
             <a:fld id="{7E1E10DE-B184-A241-B03C-CA9AF63A75A9}" type="datetimeFigureOut">
               <a:rPr lang="fr-FR" smtClean="0"/>
-              <a:t>06/01/2023</a:t>
+              <a:t>10/01/2023</a:t>
             </a:fld>
             <a:endParaRPr lang="fr-FR"/>
           </a:p>
@@ -461,7 +908,7 @@
           <a:p>
             <a:fld id="{7E1E10DE-B184-A241-B03C-CA9AF63A75A9}" type="datetimeFigureOut">
               <a:rPr lang="fr-FR" smtClean="0"/>
-              <a:t>06/01/2023</a:t>
+              <a:t>10/01/2023</a:t>
             </a:fld>
             <a:endParaRPr lang="fr-FR"/>
           </a:p>
@@ -669,7 +1116,7 @@
           <a:p>
             <a:fld id="{7E1E10DE-B184-A241-B03C-CA9AF63A75A9}" type="datetimeFigureOut">
               <a:rPr lang="fr-FR" smtClean="0"/>
-              <a:t>06/01/2023</a:t>
+              <a:t>10/01/2023</a:t>
             </a:fld>
             <a:endParaRPr lang="fr-FR"/>
           </a:p>
@@ -867,7 +1314,7 @@
           <a:p>
             <a:fld id="{7E1E10DE-B184-A241-B03C-CA9AF63A75A9}" type="datetimeFigureOut">
               <a:rPr lang="fr-FR" smtClean="0"/>
-              <a:t>06/01/2023</a:t>
+              <a:t>10/01/2023</a:t>
             </a:fld>
             <a:endParaRPr lang="fr-FR"/>
           </a:p>
@@ -1142,7 +1589,7 @@
           <a:p>
             <a:fld id="{7E1E10DE-B184-A241-B03C-CA9AF63A75A9}" type="datetimeFigureOut">
               <a:rPr lang="fr-FR" smtClean="0"/>
-              <a:t>06/01/2023</a:t>
+              <a:t>10/01/2023</a:t>
             </a:fld>
             <a:endParaRPr lang="fr-FR"/>
           </a:p>
@@ -1407,7 +1854,7 @@
           <a:p>
             <a:fld id="{7E1E10DE-B184-A241-B03C-CA9AF63A75A9}" type="datetimeFigureOut">
               <a:rPr lang="fr-FR" smtClean="0"/>
-              <a:t>06/01/2023</a:t>
+              <a:t>10/01/2023</a:t>
             </a:fld>
             <a:endParaRPr lang="fr-FR"/>
           </a:p>
@@ -1819,7 +2266,7 @@
           <a:p>
             <a:fld id="{7E1E10DE-B184-A241-B03C-CA9AF63A75A9}" type="datetimeFigureOut">
               <a:rPr lang="fr-FR" smtClean="0"/>
-              <a:t>06/01/2023</a:t>
+              <a:t>10/01/2023</a:t>
             </a:fld>
             <a:endParaRPr lang="fr-FR"/>
           </a:p>
@@ -1960,7 +2407,7 @@
           <a:p>
             <a:fld id="{7E1E10DE-B184-A241-B03C-CA9AF63A75A9}" type="datetimeFigureOut">
               <a:rPr lang="fr-FR" smtClean="0"/>
-              <a:t>06/01/2023</a:t>
+              <a:t>10/01/2023</a:t>
             </a:fld>
             <a:endParaRPr lang="fr-FR"/>
           </a:p>
@@ -2073,7 +2520,7 @@
           <a:p>
             <a:fld id="{7E1E10DE-B184-A241-B03C-CA9AF63A75A9}" type="datetimeFigureOut">
               <a:rPr lang="fr-FR" smtClean="0"/>
-              <a:t>06/01/2023</a:t>
+              <a:t>10/01/2023</a:t>
             </a:fld>
             <a:endParaRPr lang="fr-FR"/>
           </a:p>
@@ -2384,7 +2831,7 @@
           <a:p>
             <a:fld id="{7E1E10DE-B184-A241-B03C-CA9AF63A75A9}" type="datetimeFigureOut">
               <a:rPr lang="fr-FR" smtClean="0"/>
-              <a:t>06/01/2023</a:t>
+              <a:t>10/01/2023</a:t>
             </a:fld>
             <a:endParaRPr lang="fr-FR"/>
           </a:p>
@@ -2672,7 +3119,7 @@
           <a:p>
             <a:fld id="{7E1E10DE-B184-A241-B03C-CA9AF63A75A9}" type="datetimeFigureOut">
               <a:rPr lang="fr-FR" smtClean="0"/>
-              <a:t>06/01/2023</a:t>
+              <a:t>10/01/2023</a:t>
             </a:fld>
             <a:endParaRPr lang="fr-FR"/>
           </a:p>
@@ -2913,7 +3360,7 @@
           <a:p>
             <a:fld id="{7E1E10DE-B184-A241-B03C-CA9AF63A75A9}" type="datetimeFigureOut">
               <a:rPr lang="fr-FR" smtClean="0"/>
-              <a:t>06/01/2023</a:t>
+              <a:t>10/01/2023</a:t>
             </a:fld>
             <a:endParaRPr lang="fr-FR"/>
           </a:p>
@@ -3354,13 +3801,13 @@
         </p:spPr>
         <p:txBody>
           <a:bodyPr>
-            <a:normAutofit/>
+            <a:normAutofit fontScale="90000"/>
           </a:bodyPr>
           <a:lstStyle/>
           <a:p>
             <a:r>
               <a:rPr lang="fr-FR" dirty="0"/>
-              <a:t>Projet de semestre</a:t>
+              <a:t>Benchmarking the Internet Computer</a:t>
             </a:r>
           </a:p>
         </p:txBody>
@@ -3400,6 +3847,542 @@
           <p:cNvPr id="2" name="Titre 1">
             <a:extLst>
               <a:ext uri="{FF2B5EF4-FFF2-40B4-BE49-F238E27FC236}">
+                <a16:creationId xmlns:a16="http://schemas.microsoft.com/office/drawing/2014/main" id="{245B9552-59E8-31CE-FD6B-C87673503E75}"/>
+              </a:ext>
+            </a:extLst>
+          </p:cNvPr>
+          <p:cNvSpPr>
+            <a:spLocks noGrp="1"/>
+          </p:cNvSpPr>
+          <p:nvPr>
+            <p:ph type="title"/>
+          </p:nvPr>
+        </p:nvSpPr>
+        <p:spPr/>
+        <p:txBody>
+          <a:bodyPr/>
+          <a:lstStyle/>
+          <a:p>
+            <a:endParaRPr lang="en-GB" dirty="0"/>
+          </a:p>
+        </p:txBody>
+      </p:sp>
+      <p:sp>
+        <p:nvSpPr>
+          <p:cNvPr id="3" name="Espace réservé du contenu 2">
+            <a:extLst>
+              <a:ext uri="{FF2B5EF4-FFF2-40B4-BE49-F238E27FC236}">
+                <a16:creationId xmlns:a16="http://schemas.microsoft.com/office/drawing/2014/main" id="{583A7C35-F760-5169-4CCF-2D7BD1839956}"/>
+              </a:ext>
+            </a:extLst>
+          </p:cNvPr>
+          <p:cNvSpPr>
+            <a:spLocks noGrp="1"/>
+          </p:cNvSpPr>
+          <p:nvPr>
+            <p:ph idx="1"/>
+          </p:nvPr>
+        </p:nvSpPr>
+        <p:spPr/>
+        <p:txBody>
+          <a:bodyPr/>
+          <a:lstStyle/>
+          <a:p>
+            <a:r>
+              <a:rPr lang="en-GB" dirty="0"/>
+              <a:t>In each of the following case, we will vary the following parameters</a:t>
+            </a:r>
+          </a:p>
+          <a:p>
+            <a:pPr lvl="1"/>
+            <a:r>
+              <a:rPr lang="en-GB" dirty="0"/>
+              <a:t>Number of workers involved in the learning</a:t>
+            </a:r>
+          </a:p>
+          <a:p>
+            <a:pPr lvl="1"/>
+            <a:r>
+              <a:rPr lang="en-GB" dirty="0"/>
+              <a:t>Model complexity (number of weights in the model)</a:t>
+            </a:r>
+          </a:p>
+          <a:p>
+            <a:pPr lvl="1"/>
+            <a:r>
+              <a:rPr lang="en-GB" dirty="0"/>
+              <a:t>Location of Quorum nodes (closer/around the word)</a:t>
+            </a:r>
+          </a:p>
+        </p:txBody>
+      </p:sp>
+    </p:spTree>
+    <p:extLst>
+      <p:ext uri="{BB962C8B-B14F-4D97-AF65-F5344CB8AC3E}">
+        <p14:creationId xmlns:p14="http://schemas.microsoft.com/office/powerpoint/2010/main" val="2104733387"/>
+      </p:ext>
+    </p:extLst>
+  </p:cSld>
+  <p:clrMapOvr>
+    <a:masterClrMapping/>
+  </p:clrMapOvr>
+</p:sld>
+</file>
+
+<file path=ppt/slides/slide11.xml><?xml version="1.0" encoding="utf-8"?>
+<p:sld xmlns:a="http://schemas.openxmlformats.org/drawingml/2006/main" xmlns:r="http://schemas.openxmlformats.org/officeDocument/2006/relationships" xmlns:p="http://schemas.openxmlformats.org/presentationml/2006/main">
+  <p:cSld>
+    <p:spTree>
+      <p:nvGrpSpPr>
+        <p:cNvPr id="1" name=""/>
+        <p:cNvGrpSpPr/>
+        <p:nvPr/>
+      </p:nvGrpSpPr>
+      <p:grpSpPr>
+        <a:xfrm>
+          <a:off x="0" y="0"/>
+          <a:ext cx="0" cy="0"/>
+          <a:chOff x="0" y="0"/>
+          <a:chExt cx="0" cy="0"/>
+        </a:xfrm>
+      </p:grpSpPr>
+      <p:sp>
+        <p:nvSpPr>
+          <p:cNvPr id="2" name="Titre 1">
+            <a:extLst>
+              <a:ext uri="{FF2B5EF4-FFF2-40B4-BE49-F238E27FC236}">
+                <a16:creationId xmlns:a16="http://schemas.microsoft.com/office/drawing/2014/main" id="{CC09B37D-C107-3F78-6959-64EA198CDFA7}"/>
+              </a:ext>
+            </a:extLst>
+          </p:cNvPr>
+          <p:cNvSpPr>
+            <a:spLocks noGrp="1"/>
+          </p:cNvSpPr>
+          <p:nvPr>
+            <p:ph type="title"/>
+          </p:nvPr>
+        </p:nvSpPr>
+        <p:spPr/>
+        <p:txBody>
+          <a:bodyPr/>
+          <a:lstStyle/>
+          <a:p>
+            <a:r>
+              <a:rPr lang="en-GB" dirty="0"/>
+              <a:t>Simple case: </a:t>
+            </a:r>
+          </a:p>
+        </p:txBody>
+      </p:sp>
+      <p:sp>
+        <p:nvSpPr>
+          <p:cNvPr id="3" name="Espace réservé du contenu 2">
+            <a:extLst>
+              <a:ext uri="{FF2B5EF4-FFF2-40B4-BE49-F238E27FC236}">
+                <a16:creationId xmlns:a16="http://schemas.microsoft.com/office/drawing/2014/main" id="{A1D31798-EC8F-4320-1A43-853C6D3EE5BD}"/>
+              </a:ext>
+            </a:extLst>
+          </p:cNvPr>
+          <p:cNvSpPr>
+            <a:spLocks noGrp="1"/>
+          </p:cNvSpPr>
+          <p:nvPr>
+            <p:ph idx="1"/>
+          </p:nvPr>
+        </p:nvSpPr>
+        <p:spPr/>
+        <p:txBody>
+          <a:bodyPr/>
+          <a:lstStyle/>
+          <a:p>
+            <a:r>
+              <a:rPr lang="en-GB" dirty="0"/>
+              <a:t>Addition on Quorum ? NN to compute a + b</a:t>
+            </a:r>
+          </a:p>
+          <a:p>
+            <a:pPr lvl="1"/>
+            <a:r>
+              <a:rPr lang="en-GB" dirty="0"/>
+              <a:t>9 parameters (each one encoded as uint256)</a:t>
+            </a:r>
+          </a:p>
+          <a:p>
+            <a:pPr lvl="1"/>
+            <a:r>
+              <a:rPr lang="en-GB" dirty="0"/>
+              <a:t>TODO add plot of latency and % commit by varying the number of workers</a:t>
+            </a:r>
+          </a:p>
+          <a:p>
+            <a:pPr lvl="1"/>
+            <a:endParaRPr lang="en-GB" dirty="0"/>
+          </a:p>
+          <a:p>
+            <a:endParaRPr lang="en-GB" dirty="0"/>
+          </a:p>
+        </p:txBody>
+      </p:sp>
+    </p:spTree>
+    <p:extLst>
+      <p:ext uri="{BB962C8B-B14F-4D97-AF65-F5344CB8AC3E}">
+        <p14:creationId xmlns:p14="http://schemas.microsoft.com/office/powerpoint/2010/main" val="905150595"/>
+      </p:ext>
+    </p:extLst>
+  </p:cSld>
+  <p:clrMapOvr>
+    <a:masterClrMapping/>
+  </p:clrMapOvr>
+</p:sld>
+</file>
+
+<file path=ppt/slides/slide12.xml><?xml version="1.0" encoding="utf-8"?>
+<p:sld xmlns:a="http://schemas.openxmlformats.org/drawingml/2006/main" xmlns:r="http://schemas.openxmlformats.org/officeDocument/2006/relationships" xmlns:p="http://schemas.openxmlformats.org/presentationml/2006/main">
+  <p:cSld>
+    <p:spTree>
+      <p:nvGrpSpPr>
+        <p:cNvPr id="1" name=""/>
+        <p:cNvGrpSpPr/>
+        <p:nvPr/>
+      </p:nvGrpSpPr>
+      <p:grpSpPr>
+        <a:xfrm>
+          <a:off x="0" y="0"/>
+          <a:ext cx="0" cy="0"/>
+          <a:chOff x="0" y="0"/>
+          <a:chExt cx="0" cy="0"/>
+        </a:xfrm>
+      </p:grpSpPr>
+      <p:sp>
+        <p:nvSpPr>
+          <p:cNvPr id="2" name="Titre 1">
+            <a:extLst>
+              <a:ext uri="{FF2B5EF4-FFF2-40B4-BE49-F238E27FC236}">
+                <a16:creationId xmlns:a16="http://schemas.microsoft.com/office/drawing/2014/main" id="{58DE3A8F-BB7F-8AB8-59F6-C45B337CABFF}"/>
+              </a:ext>
+            </a:extLst>
+          </p:cNvPr>
+          <p:cNvSpPr>
+            <a:spLocks noGrp="1"/>
+          </p:cNvSpPr>
+          <p:nvPr>
+            <p:ph type="title"/>
+          </p:nvPr>
+        </p:nvSpPr>
+        <p:spPr/>
+        <p:txBody>
+          <a:bodyPr/>
+          <a:lstStyle/>
+          <a:p>
+            <a:r>
+              <a:rPr lang="en-GB" dirty="0"/>
+              <a:t>Now more realistic case of ML </a:t>
+            </a:r>
+          </a:p>
+        </p:txBody>
+      </p:sp>
+      <p:sp>
+        <p:nvSpPr>
+          <p:cNvPr id="3" name="Espace réservé du contenu 2">
+            <a:extLst>
+              <a:ext uri="{FF2B5EF4-FFF2-40B4-BE49-F238E27FC236}">
+                <a16:creationId xmlns:a16="http://schemas.microsoft.com/office/drawing/2014/main" id="{9C4D13AF-DE08-94B6-D33C-6ED1674A9EB8}"/>
+              </a:ext>
+            </a:extLst>
+          </p:cNvPr>
+          <p:cNvSpPr>
+            <a:spLocks noGrp="1"/>
+          </p:cNvSpPr>
+          <p:nvPr>
+            <p:ph idx="1"/>
+          </p:nvPr>
+        </p:nvSpPr>
+        <p:spPr>
+          <a:xfrm>
+            <a:off x="838200" y="1390389"/>
+            <a:ext cx="10515600" cy="4786574"/>
+          </a:xfrm>
+        </p:spPr>
+        <p:txBody>
+          <a:bodyPr>
+            <a:normAutofit fontScale="92500" lnSpcReduction="10000"/>
+          </a:bodyPr>
+          <a:lstStyle/>
+          <a:p>
+            <a:pPr marL="457200" lvl="1" indent="0">
+              <a:buNone/>
+            </a:pPr>
+            <a:endParaRPr lang="en-GB" dirty="0"/>
+          </a:p>
+          <a:p>
+            <a:r>
+              <a:rPr lang="en-GB" dirty="0"/>
+              <a:t>MNIST using CNN.</a:t>
+            </a:r>
+          </a:p>
+          <a:p>
+            <a:pPr lvl="1"/>
+            <a:r>
+              <a:rPr lang="en-GB" dirty="0"/>
+              <a:t>~ 1.6 millions of parameters (we encode them as int for simplicity)</a:t>
+            </a:r>
+          </a:p>
+          <a:p>
+            <a:pPr lvl="1"/>
+            <a:r>
+              <a:rPr lang="en-GB" dirty="0"/>
+              <a:t>TODO add plot of latency and % commit</a:t>
+            </a:r>
+          </a:p>
+          <a:p>
+            <a:pPr lvl="1"/>
+            <a:endParaRPr lang="en-GB" dirty="0"/>
+          </a:p>
+          <a:p>
+            <a:r>
+              <a:rPr lang="en-GB" dirty="0"/>
+              <a:t>BERT Base: </a:t>
+            </a:r>
+          </a:p>
+          <a:p>
+            <a:pPr lvl="1"/>
+            <a:r>
+              <a:rPr lang="en-GB" dirty="0"/>
+              <a:t>~ 110 millions of parameters (encoded as ?</a:t>
+            </a:r>
+            <a:r>
+              <a:rPr lang="en-GB" dirty="0" err="1"/>
+              <a:t>uint</a:t>
+            </a:r>
+            <a:r>
+              <a:rPr lang="en-GB" dirty="0"/>
+              <a:t>)</a:t>
+            </a:r>
+          </a:p>
+          <a:p>
+            <a:pPr lvl="1"/>
+            <a:r>
+              <a:rPr lang="en-GB" dirty="0"/>
+              <a:t>TODO add plots</a:t>
+            </a:r>
+          </a:p>
+          <a:p>
+            <a:pPr lvl="1"/>
+            <a:endParaRPr lang="en-GB" dirty="0"/>
+          </a:p>
+          <a:p>
+            <a:r>
+              <a:rPr lang="en-GB" dirty="0">
+                <a:highlight>
+                  <a:srgbClr val="FF0000"/>
+                </a:highlight>
+              </a:rPr>
+              <a:t>TODO weight currently encoded as uint256, but is this enough/not enough to be equivalent to represent the actual float weights used by those ML models ?</a:t>
+            </a:r>
+            <a:r>
+              <a:rPr lang="en-GB" dirty="0"/>
+              <a:t> (can have impact if weights are 10x heavier/lighter than in a real case)</a:t>
+            </a:r>
+          </a:p>
+        </p:txBody>
+      </p:sp>
+    </p:spTree>
+    <p:extLst>
+      <p:ext uri="{BB962C8B-B14F-4D97-AF65-F5344CB8AC3E}">
+        <p14:creationId xmlns:p14="http://schemas.microsoft.com/office/powerpoint/2010/main" val="2302859776"/>
+      </p:ext>
+    </p:extLst>
+  </p:cSld>
+  <p:clrMapOvr>
+    <a:masterClrMapping/>
+  </p:clrMapOvr>
+</p:sld>
+</file>
+
+<file path=ppt/slides/slide13.xml><?xml version="1.0" encoding="utf-8"?>
+<p:sld xmlns:a="http://schemas.openxmlformats.org/drawingml/2006/main" xmlns:r="http://schemas.openxmlformats.org/officeDocument/2006/relationships" xmlns:p="http://schemas.openxmlformats.org/presentationml/2006/main">
+  <p:cSld>
+    <p:spTree>
+      <p:nvGrpSpPr>
+        <p:cNvPr id="1" name=""/>
+        <p:cNvGrpSpPr/>
+        <p:nvPr/>
+      </p:nvGrpSpPr>
+      <p:grpSpPr>
+        <a:xfrm>
+          <a:off x="0" y="0"/>
+          <a:ext cx="0" cy="0"/>
+          <a:chOff x="0" y="0"/>
+          <a:chExt cx="0" cy="0"/>
+        </a:xfrm>
+      </p:grpSpPr>
+      <p:sp>
+        <p:nvSpPr>
+          <p:cNvPr id="2" name="Titre 1">
+            <a:extLst>
+              <a:ext uri="{FF2B5EF4-FFF2-40B4-BE49-F238E27FC236}">
+                <a16:creationId xmlns:a16="http://schemas.microsoft.com/office/drawing/2014/main" id="{85F3F46D-1DBB-7001-71DF-A5665483C9E2}"/>
+              </a:ext>
+            </a:extLst>
+          </p:cNvPr>
+          <p:cNvSpPr>
+            <a:spLocks noGrp="1"/>
+          </p:cNvSpPr>
+          <p:nvPr>
+            <p:ph type="title"/>
+          </p:nvPr>
+        </p:nvSpPr>
+        <p:spPr/>
+        <p:txBody>
+          <a:bodyPr/>
+          <a:lstStyle/>
+          <a:p>
+            <a:r>
+              <a:rPr lang="en-GB" dirty="0"/>
+              <a:t>The holy grail: CHAT-GPT3</a:t>
+            </a:r>
+          </a:p>
+        </p:txBody>
+      </p:sp>
+      <p:sp>
+        <p:nvSpPr>
+          <p:cNvPr id="3" name="Espace réservé du contenu 2">
+            <a:extLst>
+              <a:ext uri="{FF2B5EF4-FFF2-40B4-BE49-F238E27FC236}">
+                <a16:creationId xmlns:a16="http://schemas.microsoft.com/office/drawing/2014/main" id="{3E63DE52-EF4B-57C2-3FD9-191C52188163}"/>
+              </a:ext>
+            </a:extLst>
+          </p:cNvPr>
+          <p:cNvSpPr>
+            <a:spLocks noGrp="1"/>
+          </p:cNvSpPr>
+          <p:nvPr>
+            <p:ph idx="1"/>
+          </p:nvPr>
+        </p:nvSpPr>
+        <p:spPr>
+          <a:xfrm>
+            <a:off x="838200" y="1825624"/>
+            <a:ext cx="10515600" cy="4818619"/>
+          </a:xfrm>
+        </p:spPr>
+        <p:txBody>
+          <a:bodyPr>
+            <a:normAutofit lnSpcReduction="10000"/>
+          </a:bodyPr>
+          <a:lstStyle/>
+          <a:p>
+            <a:r>
+              <a:rPr lang="en-GB" dirty="0"/>
+              <a:t>Requires lots of computational resources and memory </a:t>
+            </a:r>
+          </a:p>
+          <a:p>
+            <a:r>
+              <a:rPr lang="en-GB" dirty="0"/>
+              <a:t>Can we actually store GPT3 model on the blockchain ? </a:t>
+            </a:r>
+          </a:p>
+          <a:p>
+            <a:r>
+              <a:rPr lang="en-GB" dirty="0"/>
+              <a:t>Can blockchain handle the huge amount of memory exchanged to learn CHAT-GPT ? </a:t>
+            </a:r>
+          </a:p>
+          <a:p>
+            <a:pPr lvl="1"/>
+            <a:r>
+              <a:rPr lang="en-GB" dirty="0"/>
+              <a:t>CHAT-GPT composed of multiple model</a:t>
+            </a:r>
+          </a:p>
+          <a:p>
+            <a:pPr lvl="1"/>
+            <a:r>
+              <a:rPr lang="en-GB" dirty="0"/>
+              <a:t>One of biggest one: GPT-3 with 175 billions parameters </a:t>
+            </a:r>
+          </a:p>
+          <a:p>
+            <a:pPr lvl="1"/>
+            <a:r>
+              <a:rPr lang="en-GB" dirty="0"/>
+              <a:t>We can assume CHAT-GPT only used this one</a:t>
+            </a:r>
+          </a:p>
+          <a:p>
+            <a:pPr lvl="1"/>
+            <a:r>
+              <a:rPr lang="en-GB" dirty="0"/>
+              <a:t>Is it even possible to generate and send ONE </a:t>
+            </a:r>
+            <a:r>
+              <a:rPr lang="en-GB" dirty="0" err="1"/>
+              <a:t>tx</a:t>
+            </a:r>
+            <a:r>
+              <a:rPr lang="en-GB" dirty="0"/>
+              <a:t> using diablo ? </a:t>
+            </a:r>
+          </a:p>
+          <a:p>
+            <a:r>
+              <a:rPr lang="en-GB" dirty="0"/>
+              <a:t>Probably impossible to store on a blockchain, maybe this GPT3 case can be handle by a different ML architecture ? </a:t>
+            </a:r>
+            <a:r>
+              <a:rPr lang="en-GB" dirty="0" err="1"/>
+              <a:t>E.g</a:t>
+            </a:r>
+            <a:r>
+              <a:rPr lang="en-GB" dirty="0"/>
+              <a:t> divide our model into thousands chunks, and do not replicate each chunks on each node (may break principle of blockchain) </a:t>
+            </a:r>
+          </a:p>
+          <a:p>
+            <a:pPr lvl="1"/>
+            <a:endParaRPr lang="en-GB" dirty="0"/>
+          </a:p>
+          <a:p>
+            <a:endParaRPr lang="en-GB" dirty="0"/>
+          </a:p>
+        </p:txBody>
+      </p:sp>
+    </p:spTree>
+    <p:extLst>
+      <p:ext uri="{BB962C8B-B14F-4D97-AF65-F5344CB8AC3E}">
+        <p14:creationId xmlns:p14="http://schemas.microsoft.com/office/powerpoint/2010/main" val="2672617673"/>
+      </p:ext>
+    </p:extLst>
+  </p:cSld>
+  <p:clrMapOvr>
+    <a:masterClrMapping/>
+  </p:clrMapOvr>
+</p:sld>
+</file>
+
+<file path=ppt/slides/slide14.xml><?xml version="1.0" encoding="utf-8"?>
+<p:sld xmlns:a="http://schemas.openxmlformats.org/drawingml/2006/main" xmlns:r="http://schemas.openxmlformats.org/officeDocument/2006/relationships" xmlns:p="http://schemas.openxmlformats.org/presentationml/2006/main">
+  <p:cSld>
+    <p:spTree>
+      <p:nvGrpSpPr>
+        <p:cNvPr id="1" name=""/>
+        <p:cNvGrpSpPr/>
+        <p:nvPr/>
+      </p:nvGrpSpPr>
+      <p:grpSpPr>
+        <a:xfrm>
+          <a:off x="0" y="0"/>
+          <a:ext cx="0" cy="0"/>
+          <a:chOff x="0" y="0"/>
+          <a:chExt cx="0" cy="0"/>
+        </a:xfrm>
+      </p:grpSpPr>
+      <p:sp>
+        <p:nvSpPr>
+          <p:cNvPr id="2" name="Titre 1">
+            <a:extLst>
+              <a:ext uri="{FF2B5EF4-FFF2-40B4-BE49-F238E27FC236}">
                 <a16:creationId xmlns:a16="http://schemas.microsoft.com/office/drawing/2014/main" id="{18C4AEAA-58BD-6C8C-F11D-F79775CD574D}"/>
               </a:ext>
             </a:extLst>
@@ -3441,10 +4424,65 @@
         </p:nvSpPr>
         <p:spPr/>
         <p:txBody>
-          <a:bodyPr/>
-          <a:lstStyle/>
-          <a:p>
-            <a:endParaRPr lang="en-GB"/>
+          <a:bodyPr>
+            <a:normAutofit lnSpcReduction="10000"/>
+          </a:bodyPr>
+          <a:lstStyle/>
+          <a:p>
+            <a:r>
+              <a:rPr lang="en-GB" dirty="0"/>
+              <a:t>How much gas do we need to pay workers in order for them to be profitable ? Is it still worth for workers to work on the model if the blockchain is overwhelmed. Make this computation based on hypothesis and assumptions about gas consumed to submit our transaction if blockchain is overloaded ? </a:t>
+            </a:r>
+            <a:r>
+              <a:rPr lang="en-GB" dirty="0">
+                <a:highlight>
+                  <a:srgbClr val="FF0000"/>
+                </a:highlight>
+              </a:rPr>
+              <a:t>Can we find such data ? </a:t>
+            </a:r>
+          </a:p>
+          <a:p>
+            <a:r>
+              <a:rPr lang="en-GB" dirty="0"/>
+              <a:t>For a given scenario (MNIST with CNN for example), make two trials:</a:t>
+            </a:r>
+          </a:p>
+          <a:p>
+            <a:pPr lvl="1"/>
+            <a:r>
+              <a:rPr lang="en-GB" dirty="0"/>
+              <a:t>One trial with nodes with high CPU resources, but low memory</a:t>
+            </a:r>
+          </a:p>
+          <a:p>
+            <a:pPr lvl="1"/>
+            <a:r>
+              <a:rPr lang="en-GB" dirty="0"/>
+              <a:t>One trial with nodes with low CPU resources, but high memory</a:t>
+            </a:r>
+          </a:p>
+          <a:p>
+            <a:pPr lvl="1"/>
+            <a:r>
+              <a:rPr lang="en-GB" dirty="0"/>
+              <a:t>Can monitor the nodes in order to have a finer analysis that the percentage of commit and latency. </a:t>
+            </a:r>
+            <a:r>
+              <a:rPr lang="en-GB" dirty="0">
+                <a:highlight>
+                  <a:srgbClr val="FF0000"/>
+                </a:highlight>
+              </a:rPr>
+              <a:t>See how to monitor</a:t>
+            </a:r>
+          </a:p>
+          <a:p>
+            <a:pPr lvl="1"/>
+            <a:r>
+              <a:rPr lang="en-GB" dirty="0"/>
+              <a:t>Compare, can infer that one resource over the other should be preferred upon which nodes to use to perform ML on blockchain.</a:t>
+            </a:r>
           </a:p>
         </p:txBody>
       </p:sp>
@@ -3452,6 +4490,101 @@
     <p:extLst>
       <p:ext uri="{BB962C8B-B14F-4D97-AF65-F5344CB8AC3E}">
         <p14:creationId xmlns:p14="http://schemas.microsoft.com/office/powerpoint/2010/main" val="518986822"/>
+      </p:ext>
+    </p:extLst>
+  </p:cSld>
+  <p:clrMapOvr>
+    <a:masterClrMapping/>
+  </p:clrMapOvr>
+</p:sld>
+</file>
+
+<file path=ppt/slides/slide15.xml><?xml version="1.0" encoding="utf-8"?>
+<p:sld xmlns:a="http://schemas.openxmlformats.org/drawingml/2006/main" xmlns:r="http://schemas.openxmlformats.org/officeDocument/2006/relationships" xmlns:p="http://schemas.openxmlformats.org/presentationml/2006/main">
+  <p:cSld>
+    <p:spTree>
+      <p:nvGrpSpPr>
+        <p:cNvPr id="1" name=""/>
+        <p:cNvGrpSpPr/>
+        <p:nvPr/>
+      </p:nvGrpSpPr>
+      <p:grpSpPr>
+        <a:xfrm>
+          <a:off x="0" y="0"/>
+          <a:ext cx="0" cy="0"/>
+          <a:chOff x="0" y="0"/>
+          <a:chExt cx="0" cy="0"/>
+        </a:xfrm>
+      </p:grpSpPr>
+      <p:sp>
+        <p:nvSpPr>
+          <p:cNvPr id="2" name="Titre 1">
+            <a:extLst>
+              <a:ext uri="{FF2B5EF4-FFF2-40B4-BE49-F238E27FC236}">
+                <a16:creationId xmlns:a16="http://schemas.microsoft.com/office/drawing/2014/main" id="{91494603-9EA3-BA3B-4662-5355656A58AF}"/>
+              </a:ext>
+            </a:extLst>
+          </p:cNvPr>
+          <p:cNvSpPr>
+            <a:spLocks noGrp="1"/>
+          </p:cNvSpPr>
+          <p:nvPr>
+            <p:ph type="title"/>
+          </p:nvPr>
+        </p:nvSpPr>
+        <p:spPr/>
+        <p:txBody>
+          <a:bodyPr/>
+          <a:lstStyle/>
+          <a:p>
+            <a:r>
+              <a:rPr lang="en-GB" dirty="0"/>
+              <a:t>Possible improvements</a:t>
+            </a:r>
+          </a:p>
+        </p:txBody>
+      </p:sp>
+      <p:sp>
+        <p:nvSpPr>
+          <p:cNvPr id="3" name="Espace réservé du contenu 2">
+            <a:extLst>
+              <a:ext uri="{FF2B5EF4-FFF2-40B4-BE49-F238E27FC236}">
+                <a16:creationId xmlns:a16="http://schemas.microsoft.com/office/drawing/2014/main" id="{F0FA999E-15A8-0ABC-B0E5-22F2B3368E88}"/>
+              </a:ext>
+            </a:extLst>
+          </p:cNvPr>
+          <p:cNvSpPr>
+            <a:spLocks noGrp="1"/>
+          </p:cNvSpPr>
+          <p:nvPr>
+            <p:ph idx="1"/>
+          </p:nvPr>
+        </p:nvSpPr>
+        <p:spPr/>
+        <p:txBody>
+          <a:bodyPr/>
+          <a:lstStyle/>
+          <a:p>
+            <a:r>
+              <a:rPr lang="en-GB" dirty="0"/>
+              <a:t>In our smart contract, we send an encrypted version of the model which is as long as the model, what about hashing the model weights (but need to make sure we can still proof the worker’s work and still need to send model’s weights in clear after consensus reached)? Could impact performances, to explore…</a:t>
+            </a:r>
+          </a:p>
+          <a:p>
+            <a:r>
+              <a:rPr lang="en-GB" dirty="0"/>
+              <a:t>Other things to add…</a:t>
+            </a:r>
+          </a:p>
+          <a:p>
+            <a:endParaRPr lang="en-GB" dirty="0"/>
+          </a:p>
+        </p:txBody>
+      </p:sp>
+    </p:spTree>
+    <p:extLst>
+      <p:ext uri="{BB962C8B-B14F-4D97-AF65-F5344CB8AC3E}">
+        <p14:creationId xmlns:p14="http://schemas.microsoft.com/office/powerpoint/2010/main" val="614312965"/>
       </p:ext>
     </p:extLst>
   </p:cSld>
@@ -3509,7 +4642,66 @@
             </a:r>
             <a:r>
               <a:rPr lang="fr-FR" dirty="0" err="1"/>
-              <a:t>learn</a:t>
+              <a:t>our</a:t>
+            </a:r>
+            <a:r>
+              <a:rPr lang="fr-FR" dirty="0"/>
+              <a:t> architecture</a:t>
+            </a:r>
+          </a:p>
+        </p:txBody>
+      </p:sp>
+      <p:sp>
+        <p:nvSpPr>
+          <p:cNvPr id="3" name="Espace réservé du contenu 2">
+            <a:extLst>
+              <a:ext uri="{FF2B5EF4-FFF2-40B4-BE49-F238E27FC236}">
+                <a16:creationId xmlns:a16="http://schemas.microsoft.com/office/drawing/2014/main" id="{308F80F2-9D48-CFBA-E10E-0852A23642E4}"/>
+              </a:ext>
+            </a:extLst>
+          </p:cNvPr>
+          <p:cNvSpPr>
+            <a:spLocks noGrp="1"/>
+          </p:cNvSpPr>
+          <p:nvPr>
+            <p:ph idx="1"/>
+          </p:nvPr>
+        </p:nvSpPr>
+        <p:spPr>
+          <a:xfrm>
+            <a:off x="838200" y="1413164"/>
+            <a:ext cx="10515600" cy="4763799"/>
+          </a:xfrm>
+        </p:spPr>
+        <p:txBody>
+          <a:bodyPr>
+            <a:normAutofit/>
+          </a:bodyPr>
+          <a:lstStyle/>
+          <a:p>
+            <a:pPr lvl="2">
+              <a:buFontTx/>
+              <a:buChar char="-"/>
+            </a:pPr>
+            <a:r>
+              <a:rPr lang="fr-FR" dirty="0" err="1"/>
+              <a:t>Perform</a:t>
+            </a:r>
+            <a:r>
+              <a:rPr lang="fr-FR" dirty="0"/>
+              <a:t> multiple </a:t>
+            </a:r>
+            <a:r>
+              <a:rPr lang="fr-FR" dirty="0" err="1"/>
+              <a:t>iterations</a:t>
+            </a:r>
+            <a:r>
+              <a:rPr lang="fr-FR" dirty="0"/>
+              <a:t> of </a:t>
+            </a:r>
+            <a:r>
+              <a:rPr lang="fr-FR" dirty="0" err="1"/>
+              <a:t>distributed</a:t>
             </a:r>
             <a:r>
               <a:rPr lang="fr-FR" dirty="0"/>
@@ -3517,45 +4709,324 @@
             </a:r>
             <a:r>
               <a:rPr lang="fr-FR" dirty="0" err="1"/>
-              <a:t>task</a:t>
+              <a:t>learning</a:t>
+            </a:r>
+            <a:r>
+              <a:rPr lang="fr-FR" dirty="0"/>
+              <a:t>. </a:t>
+            </a:r>
+          </a:p>
+          <a:p>
+            <a:pPr lvl="2">
+              <a:buFontTx/>
+              <a:buChar char="-"/>
+            </a:pPr>
+            <a:r>
+              <a:rPr lang="fr-FR" dirty="0"/>
+              <a:t>Communication of model </a:t>
+            </a:r>
+            <a:r>
+              <a:rPr lang="fr-FR" dirty="0" err="1"/>
+              <a:t>between</a:t>
+            </a:r>
+            <a:r>
+              <a:rPr lang="fr-FR" dirty="0"/>
+              <a:t> server and </a:t>
+            </a:r>
+            <a:r>
+              <a:rPr lang="fr-FR" dirty="0" err="1"/>
+              <a:t>workers</a:t>
+            </a:r>
+            <a:r>
+              <a:rPr lang="fr-FR" dirty="0"/>
+              <a:t> </a:t>
+            </a:r>
+            <a:r>
+              <a:rPr lang="fr-FR" dirty="0" err="1"/>
+              <a:t>using</a:t>
+            </a:r>
+            <a:r>
+              <a:rPr lang="fr-FR" dirty="0"/>
+              <a:t> blockchain</a:t>
+            </a:r>
+          </a:p>
+          <a:p>
+            <a:pPr lvl="2">
+              <a:buFontTx/>
+              <a:buChar char="-"/>
+            </a:pPr>
+            <a:r>
+              <a:rPr lang="fr-FR" dirty="0" err="1"/>
+              <a:t>Possibility</a:t>
+            </a:r>
+            <a:r>
+              <a:rPr lang="fr-FR" dirty="0"/>
+              <a:t> to </a:t>
+            </a:r>
+            <a:r>
+              <a:rPr lang="fr-FR" dirty="0" err="1"/>
+              <a:t>variate</a:t>
+            </a:r>
+            <a:r>
+              <a:rPr lang="fr-FR" dirty="0"/>
+              <a:t> </a:t>
+            </a:r>
+            <a:r>
+              <a:rPr lang="fr-FR" dirty="0" err="1"/>
+              <a:t>number</a:t>
+            </a:r>
+            <a:r>
+              <a:rPr lang="fr-FR" dirty="0"/>
+              <a:t> of </a:t>
+            </a:r>
+            <a:r>
+              <a:rPr lang="fr-FR" dirty="0" err="1"/>
+              <a:t>workers</a:t>
+            </a:r>
+            <a:r>
+              <a:rPr lang="fr-FR" dirty="0"/>
+              <a:t> </a:t>
+            </a:r>
+            <a:r>
+              <a:rPr lang="fr-FR" dirty="0" err="1"/>
+              <a:t>participating</a:t>
             </a:r>
             <a:endParaRPr lang="fr-FR" dirty="0"/>
           </a:p>
-        </p:txBody>
-      </p:sp>
-      <p:sp>
-        <p:nvSpPr>
-          <p:cNvPr id="3" name="Espace réservé du contenu 2">
-            <a:extLst>
-              <a:ext uri="{FF2B5EF4-FFF2-40B4-BE49-F238E27FC236}">
-                <a16:creationId xmlns:a16="http://schemas.microsoft.com/office/drawing/2014/main" id="{308F80F2-9D48-CFBA-E10E-0852A23642E4}"/>
-              </a:ext>
-            </a:extLst>
-          </p:cNvPr>
-          <p:cNvSpPr>
-            <a:spLocks noGrp="1"/>
-          </p:cNvSpPr>
-          <p:nvPr>
-            <p:ph idx="1"/>
-          </p:nvPr>
-        </p:nvSpPr>
-        <p:spPr/>
-        <p:txBody>
-          <a:bodyPr/>
-          <a:lstStyle/>
+          <a:p>
+            <a:pPr lvl="2">
+              <a:buFontTx/>
+              <a:buChar char="-"/>
+            </a:pPr>
+            <a:r>
+              <a:rPr lang="fr-FR" dirty="0"/>
+              <a:t>Smart </a:t>
+            </a:r>
+            <a:r>
+              <a:rPr lang="fr-FR" dirty="0" err="1"/>
+              <a:t>contract</a:t>
+            </a:r>
+            <a:r>
+              <a:rPr lang="fr-FR" dirty="0"/>
+              <a:t> on Quorum blockchain in </a:t>
+            </a:r>
+            <a:r>
+              <a:rPr lang="fr-FR" dirty="0" err="1"/>
+              <a:t>order</a:t>
+            </a:r>
+            <a:r>
+              <a:rPr lang="fr-FR" dirty="0"/>
+              <a:t> to </a:t>
+            </a:r>
+            <a:r>
+              <a:rPr lang="fr-FR" dirty="0" err="1"/>
+              <a:t>fetch</a:t>
+            </a:r>
+            <a:r>
+              <a:rPr lang="fr-FR" dirty="0"/>
+              <a:t> </a:t>
+            </a:r>
+            <a:r>
+              <a:rPr lang="fr-FR" dirty="0" err="1"/>
+              <a:t>model’s</a:t>
+            </a:r>
+            <a:r>
+              <a:rPr lang="fr-FR" dirty="0"/>
+              <a:t> </a:t>
+            </a:r>
+            <a:r>
+              <a:rPr lang="fr-FR" dirty="0" err="1"/>
+              <a:t>weight</a:t>
+            </a:r>
+            <a:endParaRPr lang="fr-FR" dirty="0"/>
+          </a:p>
+          <a:p>
+            <a:pPr lvl="2">
+              <a:buFontTx/>
+              <a:buChar char="-"/>
+            </a:pPr>
+            <a:r>
+              <a:rPr lang="fr-FR" dirty="0"/>
+              <a:t>Model update </a:t>
+            </a:r>
+            <a:r>
+              <a:rPr lang="fr-FR" dirty="0" err="1"/>
+              <a:t>done</a:t>
+            </a:r>
+            <a:r>
+              <a:rPr lang="fr-FR" dirty="0"/>
+              <a:t> on </a:t>
+            </a:r>
+            <a:r>
+              <a:rPr lang="fr-FR" dirty="0" err="1"/>
+              <a:t>worker’s</a:t>
+            </a:r>
+            <a:r>
+              <a:rPr lang="fr-FR" dirty="0"/>
+              <a:t> </a:t>
+            </a:r>
+            <a:r>
+              <a:rPr lang="fr-FR" dirty="0" err="1"/>
+              <a:t>side</a:t>
+            </a:r>
+            <a:endParaRPr lang="fr-FR" dirty="0"/>
+          </a:p>
+          <a:p>
+            <a:pPr lvl="2">
+              <a:buFontTx/>
+              <a:buChar char="-"/>
+            </a:pPr>
+            <a:r>
+              <a:rPr lang="fr-FR" dirty="0" err="1"/>
+              <a:t>Updated</a:t>
+            </a:r>
+            <a:r>
+              <a:rPr lang="fr-FR" dirty="0"/>
+              <a:t> model </a:t>
+            </a:r>
+            <a:r>
+              <a:rPr lang="fr-FR" dirty="0" err="1"/>
+              <a:t>send</a:t>
+            </a:r>
+            <a:r>
+              <a:rPr lang="fr-FR" dirty="0"/>
+              <a:t> by </a:t>
+            </a:r>
+            <a:r>
+              <a:rPr lang="fr-FR" dirty="0" err="1"/>
+              <a:t>workers</a:t>
+            </a:r>
+            <a:r>
+              <a:rPr lang="fr-FR" dirty="0"/>
+              <a:t> to the server </a:t>
+            </a:r>
+            <a:r>
+              <a:rPr lang="fr-FR" dirty="0" err="1"/>
+              <a:t>using</a:t>
+            </a:r>
+            <a:r>
+              <a:rPr lang="fr-FR" dirty="0"/>
+              <a:t> blockchain </a:t>
+            </a:r>
+          </a:p>
+          <a:p>
+            <a:pPr lvl="2">
+              <a:buFontTx/>
+              <a:buChar char="-"/>
+            </a:pPr>
+            <a:r>
+              <a:rPr lang="fr-FR" dirty="0"/>
+              <a:t>System </a:t>
+            </a:r>
+            <a:r>
+              <a:rPr lang="fr-FR" dirty="0" err="1"/>
+              <a:t>build</a:t>
+            </a:r>
+            <a:r>
+              <a:rPr lang="fr-FR" dirty="0"/>
+              <a:t> </a:t>
+            </a:r>
+            <a:r>
+              <a:rPr lang="fr-FR" dirty="0" err="1"/>
+              <a:t>such</a:t>
+            </a:r>
+            <a:r>
+              <a:rPr lang="fr-FR" dirty="0"/>
+              <a:t> </a:t>
+            </a:r>
+            <a:r>
+              <a:rPr lang="fr-FR" dirty="0" err="1"/>
+              <a:t>that</a:t>
+            </a:r>
+            <a:r>
+              <a:rPr lang="fr-FR" dirty="0"/>
+              <a:t> </a:t>
+            </a:r>
+            <a:r>
+              <a:rPr lang="fr-FR" dirty="0" err="1"/>
+              <a:t>worker</a:t>
+            </a:r>
+            <a:r>
+              <a:rPr lang="fr-FR" dirty="0"/>
+              <a:t> </a:t>
+            </a:r>
+            <a:r>
+              <a:rPr lang="fr-FR" dirty="0" err="1"/>
+              <a:t>proving</a:t>
+            </a:r>
+            <a:r>
+              <a:rPr lang="fr-FR" dirty="0"/>
+              <a:t> </a:t>
+            </a:r>
+            <a:r>
+              <a:rPr lang="fr-FR" dirty="0" err="1"/>
+              <a:t>it</a:t>
+            </a:r>
+            <a:r>
+              <a:rPr lang="fr-FR" dirty="0"/>
+              <a:t> </a:t>
+            </a:r>
+            <a:r>
+              <a:rPr lang="fr-FR" dirty="0" err="1"/>
+              <a:t>learned</a:t>
+            </a:r>
+            <a:r>
+              <a:rPr lang="fr-FR" dirty="0"/>
+              <a:t> the correct model </a:t>
+            </a:r>
+            <a:r>
+              <a:rPr lang="fr-FR" dirty="0" err="1"/>
+              <a:t>gets</a:t>
+            </a:r>
+            <a:r>
+              <a:rPr lang="fr-FR" dirty="0"/>
+              <a:t> </a:t>
+            </a:r>
+            <a:r>
+              <a:rPr lang="fr-FR" dirty="0" err="1"/>
+              <a:t>paid</a:t>
+            </a:r>
+            <a:r>
+              <a:rPr lang="fr-FR" dirty="0"/>
+              <a:t>.</a:t>
+            </a:r>
+          </a:p>
           <a:p>
             <a:pPr marL="914400" lvl="2" indent="0">
               <a:buNone/>
             </a:pPr>
-            <a:endParaRPr lang="fr-FR" dirty="0"/>
+            <a:r>
+              <a:rPr lang="fr-FR" dirty="0"/>
+              <a:t>3 phases </a:t>
+            </a:r>
+            <a:r>
+              <a:rPr lang="fr-FR" dirty="0" err="1"/>
+              <a:t>learning</a:t>
+            </a:r>
+            <a:r>
+              <a:rPr lang="fr-FR" dirty="0"/>
+              <a:t>:</a:t>
+            </a:r>
           </a:p>
           <a:p>
             <a:pPr marL="914400" lvl="2" indent="0">
               <a:buNone/>
             </a:pPr>
             <a:r>
-              <a:rPr lang="fr-FR" dirty="0" err="1"/>
-              <a:t>Job_finder.sol</a:t>
+              <a:rPr lang="fr-FR" dirty="0"/>
+              <a:t>	</a:t>
+            </a:r>
+            <a:r>
+              <a:rPr lang="fr-FR" dirty="0" err="1"/>
+              <a:t>get</a:t>
+            </a:r>
+            <a:r>
+              <a:rPr lang="fr-FR" dirty="0"/>
+              <a:t> </a:t>
+            </a:r>
+            <a:r>
+              <a:rPr lang="fr-FR" dirty="0" err="1"/>
+              <a:t>weights</a:t>
             </a:r>
             <a:endParaRPr lang="fr-FR" dirty="0"/>
           </a:p>
@@ -3564,8 +5035,28 @@
               <a:buNone/>
             </a:pPr>
             <a:r>
-              <a:rPr lang="fr-FR" dirty="0" err="1"/>
-              <a:t>Job_container.sol</a:t>
+              <a:rPr lang="fr-FR" dirty="0"/>
+              <a:t>	</a:t>
+            </a:r>
+            <a:r>
+              <a:rPr lang="fr-FR" dirty="0" err="1"/>
+              <a:t>send</a:t>
+            </a:r>
+            <a:r>
+              <a:rPr lang="fr-FR" dirty="0"/>
+              <a:t> </a:t>
+            </a:r>
+            <a:r>
+              <a:rPr lang="fr-FR" dirty="0" err="1"/>
+              <a:t>encrypted</a:t>
+            </a:r>
+            <a:r>
+              <a:rPr lang="fr-FR" dirty="0"/>
+              <a:t> </a:t>
+            </a:r>
+            <a:r>
+              <a:rPr lang="fr-FR" dirty="0" err="1"/>
+              <a:t>weights</a:t>
             </a:r>
             <a:endParaRPr lang="fr-FR" dirty="0"/>
           </a:p>
@@ -3573,69 +5064,39 @@
             <a:pPr marL="914400" lvl="2" indent="0">
               <a:buNone/>
             </a:pPr>
+            <a:r>
+              <a:rPr lang="fr-FR" dirty="0"/>
+              <a:t>	</a:t>
+            </a:r>
+            <a:r>
+              <a:rPr lang="fr-FR" dirty="0" err="1"/>
+              <a:t>send</a:t>
+            </a:r>
+            <a:r>
+              <a:rPr lang="fr-FR" dirty="0"/>
+              <a:t> </a:t>
+            </a:r>
+            <a:r>
+              <a:rPr lang="fr-FR" dirty="0" err="1"/>
+              <a:t>clear</a:t>
+            </a:r>
+            <a:r>
+              <a:rPr lang="fr-FR" dirty="0"/>
+              <a:t> </a:t>
+            </a:r>
+            <a:r>
+              <a:rPr lang="fr-FR" dirty="0" err="1"/>
+              <a:t>weights</a:t>
+            </a:r>
+            <a:r>
+              <a:rPr lang="fr-FR" dirty="0"/>
+              <a:t> + </a:t>
+            </a:r>
+            <a:r>
+              <a:rPr lang="fr-FR" dirty="0" err="1"/>
+              <a:t>veritication</a:t>
+            </a:r>
             <a:endParaRPr lang="fr-FR" dirty="0"/>
-          </a:p>
-          <a:p>
-            <a:pPr marL="914400" lvl="2" indent="0">
-              <a:buNone/>
-            </a:pPr>
-            <a:r>
-              <a:rPr lang="fr-FR" dirty="0" err="1"/>
-              <a:t>Interact</a:t>
-            </a:r>
-            <a:r>
-              <a:rPr lang="fr-FR" dirty="0"/>
-              <a:t> </a:t>
-            </a:r>
-            <a:r>
-              <a:rPr lang="fr-FR" dirty="0" err="1"/>
-              <a:t>only</a:t>
-            </a:r>
-            <a:r>
-              <a:rPr lang="fr-FR" dirty="0"/>
-              <a:t> </a:t>
-            </a:r>
-            <a:r>
-              <a:rPr lang="fr-FR" dirty="0" err="1"/>
-              <a:t>with</a:t>
-            </a:r>
-            <a:r>
-              <a:rPr lang="fr-FR" dirty="0"/>
-              <a:t> </a:t>
-            </a:r>
-            <a:r>
-              <a:rPr lang="fr-FR" dirty="0" err="1"/>
-              <a:t>job_container</a:t>
-            </a:r>
-            <a:r>
-              <a:rPr lang="fr-FR" dirty="0"/>
-              <a:t> in </a:t>
-            </a:r>
-            <a:r>
-              <a:rPr lang="fr-FR" dirty="0" err="1"/>
-              <a:t>diablo</a:t>
-            </a:r>
-            <a:r>
-              <a:rPr lang="fr-FR" dirty="0"/>
-              <a:t> </a:t>
-            </a:r>
-          </a:p>
-          <a:p>
-            <a:pPr marL="914400" lvl="2" indent="0">
-              <a:buNone/>
-            </a:pPr>
-            <a:r>
-              <a:rPr lang="fr-FR" dirty="0"/>
-              <a:t>	</a:t>
-            </a:r>
-            <a:r>
-              <a:rPr lang="fr-FR" dirty="0" err="1"/>
-              <a:t>why</a:t>
-            </a:r>
-            <a:r>
-              <a:rPr lang="fr-FR" dirty="0"/>
-              <a:t> ?? </a:t>
-            </a:r>
           </a:p>
         </p:txBody>
       </p:sp>
@@ -3674,7 +5135,7 @@
           <p:cNvPr id="2" name="Titre 1">
             <a:extLst>
               <a:ext uri="{FF2B5EF4-FFF2-40B4-BE49-F238E27FC236}">
-                <a16:creationId xmlns:a16="http://schemas.microsoft.com/office/drawing/2014/main" id="{0680BC74-EE8F-47EA-3A8E-D0EE2DCF0162}"/>
+                <a16:creationId xmlns:a16="http://schemas.microsoft.com/office/drawing/2014/main" id="{F889EB54-1A3D-645B-DCBE-EB7F271D42E1}"/>
               </a:ext>
             </a:extLst>
           </p:cNvPr>
@@ -3690,15 +5151,11 @@
           <a:bodyPr/>
           <a:lstStyle/>
           <a:p>
-            <a:r>
-              <a:rPr lang="fr-FR" dirty="0"/>
-              <a:t>Diablo </a:t>
-            </a:r>
-            <a:r>
-              <a:rPr lang="fr-FR" dirty="0" err="1"/>
-              <a:t>requests</a:t>
-            </a:r>
-            <a:endParaRPr lang="fr-FR" dirty="0"/>
+            <a:pPr algn="ctr"/>
+            <a:r>
+              <a:rPr lang="en-GB" dirty="0"/>
+              <a:t>The smart contracts</a:t>
+            </a:r>
           </a:p>
         </p:txBody>
       </p:sp>
@@ -3707,7 +5164,7 @@
           <p:cNvPr id="3" name="Espace réservé du contenu 2">
             <a:extLst>
               <a:ext uri="{FF2B5EF4-FFF2-40B4-BE49-F238E27FC236}">
-                <a16:creationId xmlns:a16="http://schemas.microsoft.com/office/drawing/2014/main" id="{CC73B57D-CCA0-C7B8-E1D8-EB5AC556C416}"/>
+                <a16:creationId xmlns:a16="http://schemas.microsoft.com/office/drawing/2014/main" id="{20D492A9-19B8-EA02-1FDF-081CB3459C91}"/>
               </a:ext>
             </a:extLst>
           </p:cNvPr>
@@ -3720,76 +5177,122 @@
         </p:nvSpPr>
         <p:spPr/>
         <p:txBody>
-          <a:bodyPr/>
-          <a:lstStyle/>
-          <a:p>
-            <a:r>
-              <a:rPr lang="fr-FR" dirty="0"/>
-              <a:t>For </a:t>
-            </a:r>
-            <a:r>
-              <a:rPr lang="fr-FR" dirty="0" err="1"/>
-              <a:t>request</a:t>
-            </a:r>
-            <a:r>
-              <a:rPr lang="fr-FR" dirty="0"/>
-              <a:t> </a:t>
-            </a:r>
-            <a:r>
-              <a:rPr lang="fr-FR" dirty="0" err="1"/>
-              <a:t>number</a:t>
-            </a:r>
-            <a:r>
-              <a:rPr lang="fr-FR" dirty="0"/>
-              <a:t> ‘i’ of </a:t>
-            </a:r>
-            <a:r>
-              <a:rPr lang="fr-FR" dirty="0" err="1"/>
-              <a:t>workload</a:t>
-            </a:r>
-            <a:r>
-              <a:rPr lang="fr-FR" dirty="0"/>
+          <a:bodyPr>
+            <a:normAutofit fontScale="92500" lnSpcReduction="10000"/>
+          </a:bodyPr>
+          <a:lstStyle/>
+          <a:p>
+            <a:r>
+              <a:rPr lang="en-GB" dirty="0"/>
+              <a:t>2 smart contracts:</a:t>
+            </a:r>
+          </a:p>
+          <a:p>
+            <a:pPr lvl="1"/>
+            <a:r>
+              <a:rPr lang="en-GB" dirty="0" err="1"/>
+              <a:t>JobFinder.sol</a:t>
+            </a:r>
+            <a:r>
+              <a:rPr lang="en-GB" dirty="0"/>
+              <a:t>: interface between workers and learning process.</a:t>
+            </a:r>
+          </a:p>
+          <a:p>
+            <a:pPr lvl="2"/>
+            <a:r>
+              <a:rPr lang="en-GB" dirty="0"/>
+              <a:t>If someone wants to participate in learning process -&gt; use API of </a:t>
+            </a:r>
+            <a:r>
+              <a:rPr lang="en-GB" dirty="0" err="1"/>
+              <a:t>JobFinder.sol</a:t>
+            </a:r>
+            <a:endParaRPr lang="en-GB" dirty="0"/>
+          </a:p>
+          <a:p>
+            <a:pPr lvl="1"/>
+            <a:r>
+              <a:rPr lang="en-GB" dirty="0" err="1"/>
+              <a:t>JobContainer.sol</a:t>
+            </a:r>
+            <a:r>
+              <a:rPr lang="en-GB" dirty="0"/>
+              <a:t>: contains all information and methods needed to perform one iteration of distributed learning.</a:t>
+            </a:r>
+          </a:p>
+          <a:p>
+            <a:pPr lvl="2"/>
+            <a:r>
+              <a:rPr lang="en-GB" dirty="0"/>
+              <a:t>Send model’s weight prior learning to workers</a:t>
+            </a:r>
+          </a:p>
+          <a:p>
+            <a:pPr lvl="2"/>
+            <a:r>
+              <a:rPr lang="en-GB" dirty="0"/>
+              <a:t>Aggregate results of workers</a:t>
+            </a:r>
+          </a:p>
+          <a:p>
+            <a:pPr lvl="2"/>
+            <a:r>
+              <a:rPr lang="en-GB" dirty="0"/>
+              <a:t>Make sure someone get paid if and only if he did actually learn the model (</a:t>
+            </a:r>
+            <a:r>
+              <a:rPr lang="en-GB" dirty="0" err="1"/>
+              <a:t>dvp</a:t>
+            </a:r>
+            <a:r>
+              <a:rPr lang="en-GB" dirty="0"/>
+              <a:t> more in final slides</a:t>
+            </a:r>
+          </a:p>
+          <a:p>
+            <a:r>
+              <a:rPr lang="en-GB" dirty="0"/>
+              <a:t>3 phase learning step:</a:t>
+            </a:r>
+          </a:p>
+          <a:p>
+            <a:pPr lvl="1"/>
+            <a:r>
+              <a:rPr lang="en-GB" dirty="0"/>
+              <a:t>Explain the </a:t>
+            </a:r>
+            <a:r>
+              <a:rPr lang="en-GB" dirty="0" err="1"/>
+              <a:t>getModelWeight</a:t>
+            </a:r>
+            <a:r>
+              <a:rPr lang="en-GB" dirty="0"/>
               <a:t>, </a:t>
             </a:r>
             <a:r>
-              <a:rPr lang="fr-FR" dirty="0" err="1"/>
-              <a:t>send</a:t>
-            </a:r>
-            <a:r>
-              <a:rPr lang="fr-FR" dirty="0"/>
-              <a:t> arguments </a:t>
-            </a:r>
-            <a:r>
-              <a:rPr lang="fr-FR" dirty="0" err="1"/>
-              <a:t>corresponding</a:t>
-            </a:r>
-            <a:r>
-              <a:rPr lang="fr-FR" dirty="0"/>
-              <a:t> to </a:t>
-            </a:r>
-            <a:r>
-              <a:rPr lang="fr-FR" dirty="0" err="1"/>
-              <a:t>worker</a:t>
-            </a:r>
-            <a:r>
-              <a:rPr lang="fr-FR" dirty="0"/>
-              <a:t> ‘i’ (</a:t>
-            </a:r>
-            <a:r>
-              <a:rPr lang="fr-FR" dirty="0" err="1"/>
-              <a:t>cf</a:t>
-            </a:r>
-            <a:r>
-              <a:rPr lang="fr-FR" dirty="0"/>
-              <a:t> </a:t>
-            </a:r>
-            <a:r>
-              <a:rPr lang="fr-FR" dirty="0" err="1"/>
-              <a:t>arguments.py</a:t>
-            </a:r>
-            <a:r>
-              <a:rPr lang="fr-FR" dirty="0"/>
-              <a:t>)</a:t>
+              <a:rPr lang="en-GB" dirty="0" err="1"/>
+              <a:t>AddNewEncryptedModel</a:t>
+            </a:r>
+            <a:r>
+              <a:rPr lang="en-GB" dirty="0"/>
+              <a:t>, </a:t>
+            </a:r>
+            <a:r>
+              <a:rPr lang="en-GB" dirty="0" err="1"/>
+              <a:t>AddVerificationParameters</a:t>
+            </a:r>
+            <a:r>
+              <a:rPr lang="en-GB" dirty="0"/>
+              <a:t> functions of the smart contract, and why they ensure that worker only get paid if did learn model. (Also prevent about some attacks, see if </a:t>
+            </a:r>
+            <a:r>
+              <a:rPr lang="en-GB" dirty="0" err="1"/>
+              <a:t>dvp</a:t>
+            </a:r>
+            <a:r>
+              <a:rPr lang="en-GB" dirty="0"/>
+              <a:t> this part more in final presentation)</a:t>
             </a:r>
           </a:p>
         </p:txBody>
@@ -3797,7 +5300,7 @@
     </p:spTree>
     <p:extLst>
       <p:ext uri="{BB962C8B-B14F-4D97-AF65-F5344CB8AC3E}">
-        <p14:creationId xmlns:p14="http://schemas.microsoft.com/office/powerpoint/2010/main" val="739893043"/>
+        <p14:creationId xmlns:p14="http://schemas.microsoft.com/office/powerpoint/2010/main" val="103804940"/>
       </p:ext>
     </p:extLst>
   </p:cSld>
@@ -3829,7 +5332,7 @@
           <p:cNvPr id="2" name="Titre 1">
             <a:extLst>
               <a:ext uri="{FF2B5EF4-FFF2-40B4-BE49-F238E27FC236}">
-                <a16:creationId xmlns:a16="http://schemas.microsoft.com/office/drawing/2014/main" id="{B2B2E252-EC39-BBF1-C258-3539F0215A0A}"/>
+                <a16:creationId xmlns:a16="http://schemas.microsoft.com/office/drawing/2014/main" id="{1080C621-49AD-4444-D683-690B5C291A15}"/>
               </a:ext>
             </a:extLst>
           </p:cNvPr>
@@ -3845,29 +5348,10 @@
           <a:bodyPr/>
           <a:lstStyle/>
           <a:p>
-            <a:r>
-              <a:rPr lang="fr-FR" dirty="0" err="1"/>
-              <a:t>What</a:t>
-            </a:r>
-            <a:r>
-              <a:rPr lang="fr-FR" dirty="0"/>
-              <a:t> </a:t>
-            </a:r>
-            <a:r>
-              <a:rPr lang="fr-FR" dirty="0" err="1"/>
-              <a:t>we</a:t>
-            </a:r>
-            <a:r>
-              <a:rPr lang="fr-FR" dirty="0"/>
-              <a:t> </a:t>
-            </a:r>
-            <a:r>
-              <a:rPr lang="fr-FR" dirty="0" err="1"/>
-              <a:t>want</a:t>
-            </a:r>
-            <a:r>
-              <a:rPr lang="fr-FR" dirty="0"/>
-              <a:t> to show</a:t>
+            <a:pPr algn="ctr"/>
+            <a:r>
+              <a:rPr lang="en-GB" dirty="0"/>
+              <a:t>Testing Smart Contract</a:t>
             </a:r>
           </a:p>
         </p:txBody>
@@ -3877,7 +5361,7 @@
           <p:cNvPr id="3" name="Espace réservé du contenu 2">
             <a:extLst>
               <a:ext uri="{FF2B5EF4-FFF2-40B4-BE49-F238E27FC236}">
-                <a16:creationId xmlns:a16="http://schemas.microsoft.com/office/drawing/2014/main" id="{DE60CF21-9826-BC34-5AA4-8FB451AD529D}"/>
+                <a16:creationId xmlns:a16="http://schemas.microsoft.com/office/drawing/2014/main" id="{7FD39BB1-3250-028B-CCDC-90BD159A9E33}"/>
               </a:ext>
             </a:extLst>
           </p:cNvPr>
@@ -3890,589 +5374,59 @@
         </p:nvSpPr>
         <p:spPr/>
         <p:txBody>
-          <a:bodyPr>
-            <a:normAutofit fontScale="92500" lnSpcReduction="10000"/>
-          </a:bodyPr>
-          <a:lstStyle/>
-          <a:p>
-            <a:r>
-              <a:rPr lang="fr-FR" dirty="0"/>
-              <a:t>Can </a:t>
-            </a:r>
-            <a:r>
-              <a:rPr lang="fr-FR" dirty="0" err="1"/>
-              <a:t>we</a:t>
-            </a:r>
-            <a:r>
-              <a:rPr lang="fr-FR" dirty="0"/>
-              <a:t> use blockchain to </a:t>
-            </a:r>
-            <a:r>
-              <a:rPr lang="fr-FR" dirty="0" err="1"/>
-              <a:t>perform</a:t>
-            </a:r>
-            <a:r>
-              <a:rPr lang="fr-FR" dirty="0"/>
-              <a:t> </a:t>
-            </a:r>
-            <a:r>
-              <a:rPr lang="fr-FR" dirty="0" err="1"/>
-              <a:t>distributed</a:t>
-            </a:r>
-            <a:r>
-              <a:rPr lang="fr-FR" dirty="0"/>
-              <a:t> ML ? </a:t>
-            </a:r>
-          </a:p>
-          <a:p>
-            <a:r>
-              <a:rPr lang="fr-FR" dirty="0"/>
-              <a:t>This </a:t>
-            </a:r>
-            <a:r>
-              <a:rPr lang="fr-FR" dirty="0" err="1"/>
-              <a:t>means</a:t>
-            </a:r>
-            <a:r>
-              <a:rPr lang="fr-FR" dirty="0"/>
-              <a:t>:</a:t>
+          <a:bodyPr/>
+          <a:lstStyle/>
+          <a:p>
+            <a:r>
+              <a:rPr lang="en-GB" dirty="0"/>
+              <a:t>Goal: See if our smart contract work as expected</a:t>
+            </a:r>
+          </a:p>
+          <a:p>
+            <a:r>
+              <a:rPr lang="en-GB" dirty="0"/>
+              <a:t>Prior to stress test the smart contract with Diablo, where we cannot see the return value of functions call</a:t>
+            </a:r>
+          </a:p>
+          <a:p>
+            <a:r>
+              <a:rPr lang="en-GB" dirty="0"/>
+              <a:t>Implementation of a small learning task using python web3 lib.</a:t>
+            </a:r>
+          </a:p>
+          <a:p>
+            <a:r>
+              <a:rPr lang="en-GB" dirty="0"/>
+              <a:t>Small python script</a:t>
             </a:r>
           </a:p>
           <a:p>
             <a:pPr lvl="1"/>
             <a:r>
-              <a:rPr lang="fr-FR" dirty="0" err="1"/>
-              <a:t>Send</a:t>
-            </a:r>
-            <a:r>
-              <a:rPr lang="fr-FR" dirty="0"/>
-              <a:t> model </a:t>
-            </a:r>
-            <a:r>
-              <a:rPr lang="fr-FR" dirty="0" err="1"/>
-              <a:t>weights</a:t>
-            </a:r>
-            <a:r>
-              <a:rPr lang="fr-FR" dirty="0"/>
-              <a:t> over blockchain (in </a:t>
-            </a:r>
-            <a:r>
-              <a:rPr lang="fr-FR" dirty="0" err="1"/>
-              <a:t>order</a:t>
-            </a:r>
-            <a:r>
-              <a:rPr lang="fr-FR" dirty="0"/>
-              <a:t> to </a:t>
-            </a:r>
-            <a:r>
-              <a:rPr lang="fr-FR" dirty="0" err="1"/>
-              <a:t>aggregate</a:t>
-            </a:r>
-            <a:r>
-              <a:rPr lang="fr-FR" dirty="0"/>
-              <a:t> </a:t>
-            </a:r>
-            <a:r>
-              <a:rPr lang="fr-FR" dirty="0" err="1"/>
-              <a:t>results</a:t>
-            </a:r>
-            <a:r>
-              <a:rPr lang="fr-FR" dirty="0"/>
-              <a:t>)</a:t>
+              <a:rPr lang="en-GB" dirty="0"/>
+              <a:t>Some simple learning scenarios, to test the global flow</a:t>
             </a:r>
           </a:p>
           <a:p>
             <a:pPr lvl="1"/>
             <a:r>
-              <a:rPr lang="fr-FR" dirty="0" err="1"/>
-              <a:t>Verify</a:t>
-            </a:r>
-            <a:r>
-              <a:rPr lang="fr-FR" dirty="0"/>
-              <a:t> </a:t>
-            </a:r>
-            <a:r>
-              <a:rPr lang="fr-FR" dirty="0" err="1"/>
-              <a:t>that</a:t>
-            </a:r>
-            <a:r>
-              <a:rPr lang="fr-FR" dirty="0"/>
-              <a:t> </a:t>
-            </a:r>
-            <a:r>
-              <a:rPr lang="fr-FR" dirty="0" err="1"/>
-              <a:t>weights</a:t>
-            </a:r>
-            <a:r>
-              <a:rPr lang="fr-FR" dirty="0"/>
-              <a:t> are correct</a:t>
+              <a:rPr lang="en-GB" dirty="0"/>
+              <a:t>Check return value of smart contract call, in order to ensure correct </a:t>
+            </a:r>
+            <a:r>
+              <a:rPr lang="en-GB" dirty="0" err="1"/>
+              <a:t>behavior</a:t>
+            </a:r>
+            <a:r>
+              <a:rPr lang="en-GB" dirty="0"/>
+              <a:t> of the smart contract</a:t>
             </a:r>
           </a:p>
           <a:p>
             <a:pPr lvl="1"/>
             <a:r>
-              <a:rPr lang="fr-FR" dirty="0" err="1"/>
-              <a:t>Consequences</a:t>
-            </a:r>
-            <a:r>
-              <a:rPr lang="fr-FR" dirty="0"/>
-              <a:t>: Model </a:t>
-            </a:r>
-            <a:r>
-              <a:rPr lang="fr-FR" dirty="0" err="1"/>
-              <a:t>statisticaly</a:t>
-            </a:r>
-            <a:r>
-              <a:rPr lang="fr-FR" dirty="0"/>
-              <a:t> </a:t>
-            </a:r>
-            <a:r>
-              <a:rPr lang="fr-FR" dirty="0" err="1"/>
-              <a:t>resilient</a:t>
-            </a:r>
-            <a:r>
-              <a:rPr lang="fr-FR" dirty="0"/>
-              <a:t> to </a:t>
-            </a:r>
-            <a:r>
-              <a:rPr lang="fr-FR" dirty="0" err="1"/>
-              <a:t>bizantine</a:t>
-            </a:r>
-            <a:r>
-              <a:rPr lang="fr-FR" dirty="0"/>
-              <a:t> </a:t>
-            </a:r>
-            <a:r>
-              <a:rPr lang="fr-FR" dirty="0" err="1"/>
-              <a:t>attack</a:t>
-            </a:r>
-            <a:r>
-              <a:rPr lang="fr-FR" dirty="0"/>
-              <a:t>, </a:t>
-            </a:r>
-            <a:r>
-              <a:rPr lang="fr-FR" dirty="0" err="1"/>
-              <a:t>only</a:t>
-            </a:r>
-            <a:r>
-              <a:rPr lang="fr-FR" dirty="0"/>
-              <a:t> </a:t>
-            </a:r>
-            <a:r>
-              <a:rPr lang="fr-FR" dirty="0" err="1"/>
-              <a:t>based</a:t>
-            </a:r>
-            <a:r>
-              <a:rPr lang="fr-FR" dirty="0"/>
-              <a:t> on the </a:t>
-            </a:r>
-            <a:r>
-              <a:rPr lang="fr-FR" dirty="0" err="1"/>
-              <a:t>fact</a:t>
-            </a:r>
-            <a:r>
-              <a:rPr lang="fr-FR" dirty="0"/>
-              <a:t> </a:t>
-            </a:r>
-            <a:r>
-              <a:rPr lang="en-GB" dirty="0"/>
-              <a:t>that</a:t>
-            </a:r>
-            <a:r>
-              <a:rPr lang="fr-FR" dirty="0"/>
-              <a:t> </a:t>
-            </a:r>
-            <a:r>
-              <a:rPr lang="fr-FR" dirty="0" err="1"/>
-              <a:t>we</a:t>
-            </a:r>
-            <a:r>
-              <a:rPr lang="fr-FR" dirty="0"/>
-              <a:t> assume &gt; 50% correct </a:t>
-            </a:r>
-            <a:r>
-              <a:rPr lang="fr-FR" dirty="0" err="1"/>
-              <a:t>workers</a:t>
-            </a:r>
-            <a:r>
-              <a:rPr lang="fr-FR" dirty="0"/>
-              <a:t> in a pool (</a:t>
-            </a:r>
-            <a:r>
-              <a:rPr lang="fr-FR" dirty="0" err="1"/>
-              <a:t>i.e</a:t>
-            </a:r>
-            <a:r>
-              <a:rPr lang="fr-FR" dirty="0"/>
-              <a:t> </a:t>
-            </a:r>
-            <a:r>
-              <a:rPr lang="fr-FR" dirty="0" err="1"/>
-              <a:t>same</a:t>
-            </a:r>
-            <a:r>
-              <a:rPr lang="fr-FR" dirty="0"/>
-              <a:t> </a:t>
-            </a:r>
-            <a:r>
-              <a:rPr lang="fr-FR" dirty="0" err="1"/>
-              <a:t>learning</a:t>
-            </a:r>
-            <a:r>
-              <a:rPr lang="fr-FR" dirty="0"/>
-              <a:t> </a:t>
-            </a:r>
-            <a:r>
-              <a:rPr lang="fr-FR" dirty="0" err="1"/>
-              <a:t>task</a:t>
-            </a:r>
-            <a:r>
-              <a:rPr lang="fr-FR" dirty="0"/>
-              <a:t>)</a:t>
-            </a:r>
-          </a:p>
-          <a:p>
-            <a:r>
-              <a:rPr lang="fr-FR" dirty="0"/>
-              <a:t>Assumptions: </a:t>
-            </a:r>
-            <a:r>
-              <a:rPr lang="fr-FR" dirty="0" err="1"/>
-              <a:t>We</a:t>
-            </a:r>
-            <a:r>
-              <a:rPr lang="fr-FR" dirty="0"/>
-              <a:t> </a:t>
-            </a:r>
-            <a:r>
-              <a:rPr lang="fr-FR" dirty="0" err="1"/>
-              <a:t>perform</a:t>
-            </a:r>
-            <a:r>
-              <a:rPr lang="fr-FR" dirty="0"/>
-              <a:t> «Fake» </a:t>
-            </a:r>
-            <a:r>
-              <a:rPr lang="fr-FR" dirty="0" err="1"/>
-              <a:t>learning</a:t>
-            </a:r>
-            <a:r>
-              <a:rPr lang="fr-FR" dirty="0"/>
-              <a:t>. </a:t>
-            </a:r>
-            <a:r>
-              <a:rPr lang="fr-FR" dirty="0" err="1"/>
-              <a:t>I.e</a:t>
-            </a:r>
-            <a:r>
-              <a:rPr lang="fr-FR" dirty="0"/>
-              <a:t> </a:t>
-            </a:r>
-            <a:r>
-              <a:rPr lang="fr-FR" dirty="0" err="1"/>
-              <a:t>workers</a:t>
-            </a:r>
-            <a:r>
-              <a:rPr lang="fr-FR" dirty="0"/>
-              <a:t> download </a:t>
-            </a:r>
-            <a:r>
-              <a:rPr lang="fr-FR" dirty="0" err="1"/>
-              <a:t>weights</a:t>
-            </a:r>
-            <a:r>
-              <a:rPr lang="fr-FR" dirty="0"/>
-              <a:t> of the correct </a:t>
-            </a:r>
-            <a:r>
-              <a:rPr lang="fr-FR" dirty="0" err="1"/>
-              <a:t>length</a:t>
-            </a:r>
-            <a:r>
-              <a:rPr lang="fr-FR" dirty="0"/>
-              <a:t>, but </a:t>
-            </a:r>
-            <a:r>
-              <a:rPr lang="fr-FR" dirty="0" err="1"/>
-              <a:t>actually</a:t>
-            </a:r>
-            <a:r>
-              <a:rPr lang="fr-FR" dirty="0"/>
-              <a:t> </a:t>
-            </a:r>
-            <a:r>
-              <a:rPr lang="fr-FR" dirty="0" err="1"/>
-              <a:t>just</a:t>
-            </a:r>
-            <a:r>
-              <a:rPr lang="fr-FR" dirty="0"/>
-              <a:t> </a:t>
-            </a:r>
-            <a:r>
-              <a:rPr lang="fr-FR" dirty="0" err="1"/>
-              <a:t>wait</a:t>
-            </a:r>
-            <a:r>
-              <a:rPr lang="fr-FR" dirty="0"/>
-              <a:t> </a:t>
-            </a:r>
-            <a:r>
-              <a:rPr lang="fr-FR" dirty="0" err="1"/>
-              <a:t>some</a:t>
-            </a:r>
-            <a:r>
-              <a:rPr lang="fr-FR" dirty="0"/>
-              <a:t> time to </a:t>
-            </a:r>
-            <a:r>
-              <a:rPr lang="fr-FR" dirty="0" err="1"/>
-              <a:t>simulate</a:t>
-            </a:r>
-            <a:r>
-              <a:rPr lang="fr-FR" dirty="0"/>
-              <a:t> a </a:t>
-            </a:r>
-            <a:r>
-              <a:rPr lang="fr-FR" dirty="0" err="1"/>
-              <a:t>learning</a:t>
-            </a:r>
-            <a:r>
-              <a:rPr lang="fr-FR" dirty="0"/>
-              <a:t> phase, and </a:t>
-            </a:r>
-            <a:r>
-              <a:rPr lang="fr-FR" dirty="0" err="1"/>
-              <a:t>then</a:t>
-            </a:r>
-            <a:r>
-              <a:rPr lang="fr-FR" dirty="0"/>
-              <a:t> </a:t>
-            </a:r>
-            <a:r>
-              <a:rPr lang="fr-FR" dirty="0" err="1"/>
-              <a:t>send</a:t>
-            </a:r>
-            <a:r>
-              <a:rPr lang="fr-FR" dirty="0"/>
-              <a:t> </a:t>
-            </a:r>
-            <a:r>
-              <a:rPr lang="fr-FR" dirty="0" err="1"/>
-              <a:t>either</a:t>
-            </a:r>
-            <a:r>
-              <a:rPr lang="fr-FR" dirty="0"/>
-              <a:t> «Correct» </a:t>
-            </a:r>
-            <a:r>
-              <a:rPr lang="fr-FR" dirty="0" err="1"/>
-              <a:t>weights</a:t>
-            </a:r>
-            <a:r>
-              <a:rPr lang="fr-FR" dirty="0"/>
-              <a:t> – in </a:t>
-            </a:r>
-            <a:r>
-              <a:rPr lang="fr-FR" dirty="0" err="1"/>
-              <a:t>order</a:t>
-            </a:r>
-            <a:r>
-              <a:rPr lang="fr-FR" dirty="0"/>
-              <a:t> to have a </a:t>
-            </a:r>
-            <a:r>
-              <a:rPr lang="fr-FR" dirty="0" err="1"/>
-              <a:t>majority</a:t>
-            </a:r>
-            <a:r>
-              <a:rPr lang="fr-FR" dirty="0"/>
-              <a:t> of </a:t>
-            </a:r>
-            <a:r>
-              <a:rPr lang="fr-FR" dirty="0" err="1"/>
-              <a:t>similar</a:t>
-            </a:r>
-            <a:r>
-              <a:rPr lang="fr-FR" dirty="0"/>
-              <a:t> </a:t>
-            </a:r>
-            <a:r>
-              <a:rPr lang="fr-FR" dirty="0" err="1"/>
-              <a:t>weight</a:t>
-            </a:r>
-            <a:r>
-              <a:rPr lang="fr-FR" dirty="0"/>
-              <a:t>, or </a:t>
-            </a:r>
-            <a:r>
-              <a:rPr lang="fr-FR" dirty="0" err="1"/>
-              <a:t>bad</a:t>
-            </a:r>
-            <a:r>
-              <a:rPr lang="fr-FR" dirty="0"/>
-              <a:t> </a:t>
-            </a:r>
-            <a:r>
-              <a:rPr lang="fr-FR" dirty="0" err="1"/>
-              <a:t>weights</a:t>
-            </a:r>
-            <a:r>
-              <a:rPr lang="fr-FR" dirty="0"/>
-              <a:t> (</a:t>
-            </a:r>
-            <a:r>
-              <a:rPr lang="fr-FR" dirty="0" err="1"/>
-              <a:t>rdm</a:t>
-            </a:r>
-            <a:r>
-              <a:rPr lang="fr-FR" dirty="0"/>
-              <a:t> </a:t>
-            </a:r>
-            <a:r>
-              <a:rPr lang="fr-FR" dirty="0" err="1"/>
-              <a:t>numbers</a:t>
-            </a:r>
-            <a:r>
-              <a:rPr lang="fr-FR" dirty="0"/>
-              <a:t>))</a:t>
-            </a:r>
-          </a:p>
-          <a:p>
-            <a:r>
-              <a:rPr lang="fr-FR" dirty="0" err="1"/>
-              <a:t>We</a:t>
-            </a:r>
-            <a:r>
-              <a:rPr lang="fr-FR" dirty="0"/>
-              <a:t> </a:t>
-            </a:r>
-            <a:r>
-              <a:rPr lang="fr-FR" dirty="0" err="1"/>
-              <a:t>also</a:t>
-            </a:r>
-            <a:r>
-              <a:rPr lang="fr-FR" dirty="0"/>
-              <a:t> </a:t>
-            </a:r>
-            <a:r>
-              <a:rPr lang="fr-FR" dirty="0" err="1"/>
-              <a:t>don’t</a:t>
-            </a:r>
-            <a:r>
-              <a:rPr lang="fr-FR" dirty="0"/>
-              <a:t> </a:t>
-            </a:r>
-            <a:r>
-              <a:rPr lang="fr-FR" dirty="0" err="1"/>
-              <a:t>aggregate</a:t>
-            </a:r>
-            <a:r>
-              <a:rPr lang="fr-FR" dirty="0"/>
-              <a:t> </a:t>
-            </a:r>
-            <a:r>
-              <a:rPr lang="fr-FR" dirty="0" err="1"/>
-              <a:t>result</a:t>
-            </a:r>
-            <a:r>
-              <a:rPr lang="fr-FR" dirty="0"/>
-              <a:t> of the </a:t>
-            </a:r>
-            <a:r>
-              <a:rPr lang="fr-FR" dirty="0" err="1"/>
-              <a:t>federated</a:t>
-            </a:r>
-            <a:r>
-              <a:rPr lang="fr-FR" dirty="0"/>
-              <a:t> </a:t>
-            </a:r>
-            <a:r>
-              <a:rPr lang="fr-FR" dirty="0" err="1"/>
-              <a:t>learning</a:t>
-            </a:r>
-            <a:r>
-              <a:rPr lang="fr-FR" dirty="0"/>
-              <a:t>, </a:t>
-            </a:r>
-            <a:r>
-              <a:rPr lang="fr-FR" dirty="0" err="1"/>
-              <a:t>i.e</a:t>
-            </a:r>
-            <a:r>
-              <a:rPr lang="fr-FR" dirty="0"/>
-              <a:t> </a:t>
-            </a:r>
-            <a:r>
-              <a:rPr lang="fr-FR" dirty="0" err="1"/>
-              <a:t>next</a:t>
-            </a:r>
-            <a:r>
-              <a:rPr lang="fr-FR" dirty="0"/>
-              <a:t> </a:t>
-            </a:r>
-            <a:r>
-              <a:rPr lang="fr-FR" dirty="0" err="1"/>
-              <a:t>learning</a:t>
-            </a:r>
-            <a:r>
-              <a:rPr lang="fr-FR" dirty="0"/>
-              <a:t> </a:t>
-            </a:r>
-            <a:r>
-              <a:rPr lang="fr-FR" dirty="0" err="1"/>
-              <a:t>task</a:t>
-            </a:r>
-            <a:r>
-              <a:rPr lang="fr-FR" dirty="0"/>
-              <a:t> </a:t>
-            </a:r>
-            <a:r>
-              <a:rPr lang="fr-FR" dirty="0" err="1"/>
-              <a:t>weight</a:t>
-            </a:r>
-            <a:r>
-              <a:rPr lang="fr-FR" dirty="0"/>
-              <a:t> </a:t>
-            </a:r>
-            <a:r>
-              <a:rPr lang="fr-FR" dirty="0" err="1"/>
-              <a:t>isn’t</a:t>
-            </a:r>
-            <a:r>
-              <a:rPr lang="fr-FR" dirty="0"/>
-              <a:t> </a:t>
-            </a:r>
-            <a:r>
-              <a:rPr lang="fr-FR" dirty="0" err="1"/>
-              <a:t>obtained</a:t>
-            </a:r>
-            <a:r>
-              <a:rPr lang="fr-FR" dirty="0"/>
-              <a:t> </a:t>
-            </a:r>
-            <a:r>
-              <a:rPr lang="fr-FR" dirty="0" err="1"/>
-              <a:t>from</a:t>
-            </a:r>
-            <a:r>
-              <a:rPr lang="fr-FR" dirty="0"/>
-              <a:t> </a:t>
-            </a:r>
-            <a:r>
-              <a:rPr lang="fr-FR" dirty="0" err="1"/>
-              <a:t>previous</a:t>
-            </a:r>
-            <a:r>
-              <a:rPr lang="fr-FR" dirty="0"/>
-              <a:t> </a:t>
-            </a:r>
-            <a:r>
-              <a:rPr lang="fr-FR" dirty="0" err="1"/>
-              <a:t>results</a:t>
-            </a:r>
-            <a:r>
-              <a:rPr lang="fr-FR" dirty="0"/>
-              <a:t>.  </a:t>
+              <a:rPr lang="en-GB" dirty="0"/>
+              <a:t>Check the state of smart contract after one learning iteration (correct model available)</a:t>
             </a:r>
           </a:p>
         </p:txBody>
@@ -4480,7 +5434,7 @@
     </p:spTree>
     <p:extLst>
       <p:ext uri="{BB962C8B-B14F-4D97-AF65-F5344CB8AC3E}">
-        <p14:creationId xmlns:p14="http://schemas.microsoft.com/office/powerpoint/2010/main" val="1161397255"/>
+        <p14:creationId xmlns:p14="http://schemas.microsoft.com/office/powerpoint/2010/main" val="3951132217"/>
       </p:ext>
     </p:extLst>
   </p:cSld>
@@ -4512,7 +5466,7 @@
           <p:cNvPr id="2" name="Titre 1">
             <a:extLst>
               <a:ext uri="{FF2B5EF4-FFF2-40B4-BE49-F238E27FC236}">
-                <a16:creationId xmlns:a16="http://schemas.microsoft.com/office/drawing/2014/main" id="{D4EEC784-13C4-371B-94EB-9323C955F356}"/>
+                <a16:creationId xmlns:a16="http://schemas.microsoft.com/office/drawing/2014/main" id="{5853E01F-0402-C2C9-5993-E3DE757BF121}"/>
               </a:ext>
             </a:extLst>
           </p:cNvPr>
@@ -4528,9 +5482,10 @@
           <a:bodyPr/>
           <a:lstStyle/>
           <a:p>
-            <a:r>
-              <a:rPr lang="en-GB" dirty="0"/>
-              <a:t>Our workers:</a:t>
+            <a:pPr algn="ctr"/>
+            <a:r>
+              <a:rPr lang="en-GB" dirty="0"/>
+              <a:t>Stress testing the blockchain using Diablo</a:t>
             </a:r>
           </a:p>
         </p:txBody>
@@ -4540,7 +5495,7 @@
           <p:cNvPr id="3" name="Espace réservé du contenu 2">
             <a:extLst>
               <a:ext uri="{FF2B5EF4-FFF2-40B4-BE49-F238E27FC236}">
-                <a16:creationId xmlns:a16="http://schemas.microsoft.com/office/drawing/2014/main" id="{F1325B1F-711A-66C2-9C23-2294A16C514F}"/>
+                <a16:creationId xmlns:a16="http://schemas.microsoft.com/office/drawing/2014/main" id="{6C48E007-DEC2-9506-4403-033B4A552D3C}"/>
               </a:ext>
             </a:extLst>
           </p:cNvPr>
@@ -4558,27 +5513,70 @@
           <a:p>
             <a:r>
               <a:rPr lang="en-GB" dirty="0"/>
-              <a:t>Each of our worker will have an estimated power of:</a:t>
+              <a:t>Use of diablo in order to scale out what we did in previous slide.</a:t>
+            </a:r>
+          </a:p>
+          <a:p>
+            <a:r>
+              <a:rPr lang="en-GB" dirty="0"/>
+              <a:t>Vary the number of workers participating in learning process </a:t>
+            </a:r>
+          </a:p>
+          <a:p>
+            <a:r>
+              <a:rPr lang="en-GB" dirty="0"/>
+              <a:t>Can be use both on DCL </a:t>
+            </a:r>
+            <a:r>
+              <a:rPr lang="en-GB" dirty="0" err="1"/>
+              <a:t>vms</a:t>
+            </a:r>
+            <a:r>
+              <a:rPr lang="en-GB" dirty="0"/>
+              <a:t>’ and on AWS for more realistic cases</a:t>
+            </a:r>
+          </a:p>
+          <a:p>
+            <a:r>
+              <a:rPr lang="en-GB" dirty="0"/>
+              <a:t>Quorum blockchain deployed on nodes created with AWS.</a:t>
             </a:r>
           </a:p>
           <a:p>
             <a:pPr lvl="1"/>
             <a:r>
               <a:rPr lang="en-GB" dirty="0"/>
-              <a:t>CPU = ???</a:t>
+              <a:t>Different scenario possible: all nodes in same region, </a:t>
+            </a:r>
+            <a:r>
+              <a:rPr lang="en-GB" dirty="0" err="1"/>
+              <a:t>distribured</a:t>
+            </a:r>
+            <a:r>
+              <a:rPr lang="en-GB" dirty="0"/>
+              <a:t> over the word</a:t>
             </a:r>
           </a:p>
           <a:p>
             <a:pPr lvl="1"/>
             <a:r>
               <a:rPr lang="en-GB" dirty="0"/>
-              <a:t>Memory = ??? </a:t>
-            </a:r>
-          </a:p>
-          <a:p>
-            <a:r>
-              <a:rPr lang="en-GB" dirty="0"/>
-              <a:t>This is important if we want to simulate the learning time for one iteration of MNIST-with-CNN/BERT</a:t>
+              <a:t>Varying number of nodes ? </a:t>
+            </a:r>
+          </a:p>
+          <a:p>
+            <a:pPr lvl="1"/>
+            <a:r>
+              <a:rPr lang="en-GB" dirty="0"/>
+              <a:t>Varying capacity of nodes ? (fraction of nodes with high </a:t>
+            </a:r>
+            <a:r>
+              <a:rPr lang="en-GB" dirty="0" err="1"/>
+              <a:t>cpu</a:t>
+            </a:r>
+            <a:r>
+              <a:rPr lang="en-GB" dirty="0"/>
+              <a:t> power )</a:t>
             </a:r>
           </a:p>
         </p:txBody>
@@ -4586,7 +5584,7 @@
     </p:spTree>
     <p:extLst>
       <p:ext uri="{BB962C8B-B14F-4D97-AF65-F5344CB8AC3E}">
-        <p14:creationId xmlns:p14="http://schemas.microsoft.com/office/powerpoint/2010/main" val="1592916139"/>
+        <p14:creationId xmlns:p14="http://schemas.microsoft.com/office/powerpoint/2010/main" val="75884123"/>
       </p:ext>
     </p:extLst>
   </p:cSld>
@@ -4618,7 +5616,7 @@
           <p:cNvPr id="2" name="Titre 1">
             <a:extLst>
               <a:ext uri="{FF2B5EF4-FFF2-40B4-BE49-F238E27FC236}">
-                <a16:creationId xmlns:a16="http://schemas.microsoft.com/office/drawing/2014/main" id="{CC09B37D-C107-3F78-6959-64EA198CDFA7}"/>
+                <a16:creationId xmlns:a16="http://schemas.microsoft.com/office/drawing/2014/main" id="{0680BC74-EE8F-47EA-3A8E-D0EE2DCF0162}"/>
               </a:ext>
             </a:extLst>
           </p:cNvPr>
@@ -4634,9 +5632,10 @@
           <a:bodyPr/>
           <a:lstStyle/>
           <a:p>
-            <a:r>
-              <a:rPr lang="en-GB" dirty="0"/>
-              <a:t>Simple case: ML model as one integer </a:t>
+            <a:pPr algn="ctr"/>
+            <a:r>
+              <a:rPr lang="fr-FR" dirty="0"/>
+              <a:t>Diablo transactions arguments</a:t>
             </a:r>
           </a:p>
         </p:txBody>
@@ -4646,7 +5645,7 @@
           <p:cNvPr id="3" name="Espace réservé du contenu 2">
             <a:extLst>
               <a:ext uri="{FF2B5EF4-FFF2-40B4-BE49-F238E27FC236}">
-                <a16:creationId xmlns:a16="http://schemas.microsoft.com/office/drawing/2014/main" id="{A1D31798-EC8F-4320-1A43-853C6D3EE5BD}"/>
+                <a16:creationId xmlns:a16="http://schemas.microsoft.com/office/drawing/2014/main" id="{CC73B57D-CCA0-C7B8-E1D8-EB5AC556C416}"/>
               </a:ext>
             </a:extLst>
           </p:cNvPr>
@@ -4663,25 +5662,232 @@
           <a:lstStyle/>
           <a:p>
             <a:r>
-              <a:rPr lang="en-GB" dirty="0"/>
-              <a:t>Graph of latency and % commit by varying the number of workers</a:t>
-            </a:r>
-          </a:p>
-          <a:p>
-            <a:endParaRPr lang="en-GB" dirty="0"/>
-          </a:p>
-          <a:p>
-            <a:r>
-              <a:rPr lang="en-GB" dirty="0"/>
-              <a:t>TODO add graph</a:t>
-            </a:r>
+              <a:rPr lang="fr-FR" dirty="0" err="1"/>
+              <a:t>Explain</a:t>
+            </a:r>
+            <a:r>
+              <a:rPr lang="fr-FR" dirty="0"/>
+              <a:t> ’</a:t>
+            </a:r>
+            <a:r>
+              <a:rPr lang="fr-FR" dirty="0" err="1"/>
+              <a:t>briefly</a:t>
+            </a:r>
+            <a:r>
+              <a:rPr lang="fr-FR" dirty="0"/>
+              <a:t>’ the argument file for </a:t>
+            </a:r>
+            <a:r>
+              <a:rPr lang="fr-FR" dirty="0" err="1"/>
+              <a:t>diablo</a:t>
+            </a:r>
+            <a:r>
+              <a:rPr lang="fr-FR" dirty="0"/>
+              <a:t>:</a:t>
+            </a:r>
+          </a:p>
+          <a:p>
+            <a:pPr lvl="1"/>
+            <a:r>
+              <a:rPr lang="fr-FR" dirty="0"/>
+              <a:t>Set </a:t>
+            </a:r>
+            <a:r>
+              <a:rPr lang="fr-FR" dirty="0" err="1"/>
+              <a:t>number</a:t>
+            </a:r>
+            <a:r>
+              <a:rPr lang="fr-FR" dirty="0"/>
+              <a:t> of </a:t>
+            </a:r>
+            <a:r>
+              <a:rPr lang="fr-FR" dirty="0" err="1"/>
+              <a:t>workers</a:t>
+            </a:r>
+            <a:r>
+              <a:rPr lang="fr-FR" dirty="0"/>
+              <a:t>, and model </a:t>
+            </a:r>
+            <a:r>
+              <a:rPr lang="fr-FR" dirty="0" err="1"/>
+              <a:t>number</a:t>
+            </a:r>
+            <a:r>
+              <a:rPr lang="fr-FR" dirty="0"/>
+              <a:t> of </a:t>
+            </a:r>
+            <a:r>
+              <a:rPr lang="fr-FR" dirty="0" err="1"/>
+              <a:t>weights</a:t>
+            </a:r>
+            <a:endParaRPr lang="fr-FR" dirty="0"/>
+          </a:p>
+          <a:p>
+            <a:pPr lvl="1"/>
+            <a:r>
+              <a:rPr lang="fr-FR" dirty="0" err="1"/>
+              <a:t>Make</a:t>
+            </a:r>
+            <a:r>
+              <a:rPr lang="fr-FR" dirty="0"/>
+              <a:t> sure </a:t>
+            </a:r>
+            <a:r>
+              <a:rPr lang="fr-FR" dirty="0" err="1"/>
+              <a:t>we</a:t>
+            </a:r>
+            <a:r>
+              <a:rPr lang="fr-FR" dirty="0"/>
+              <a:t> </a:t>
+            </a:r>
+            <a:r>
+              <a:rPr lang="fr-FR" dirty="0" err="1"/>
+              <a:t>send</a:t>
+            </a:r>
+            <a:r>
+              <a:rPr lang="fr-FR" dirty="0"/>
+              <a:t> </a:t>
+            </a:r>
+            <a:r>
+              <a:rPr lang="fr-FR" dirty="0" err="1"/>
+              <a:t>coherent</a:t>
+            </a:r>
+            <a:r>
+              <a:rPr lang="fr-FR" dirty="0"/>
+              <a:t> transactions </a:t>
+            </a:r>
+            <a:r>
+              <a:rPr lang="fr-FR" dirty="0" err="1"/>
+              <a:t>based</a:t>
+            </a:r>
+            <a:r>
+              <a:rPr lang="fr-FR" dirty="0"/>
+              <a:t> on </a:t>
+            </a:r>
+            <a:r>
+              <a:rPr lang="fr-FR" dirty="0" err="1"/>
+              <a:t>our</a:t>
+            </a:r>
+            <a:r>
+              <a:rPr lang="fr-FR" dirty="0"/>
+              <a:t> </a:t>
+            </a:r>
+            <a:r>
+              <a:rPr lang="fr-FR" dirty="0" err="1"/>
+              <a:t>assumptions</a:t>
+            </a:r>
+            <a:endParaRPr lang="fr-FR" dirty="0"/>
+          </a:p>
+          <a:p>
+            <a:pPr lvl="2"/>
+            <a:r>
+              <a:rPr lang="fr-FR" dirty="0" err="1"/>
+              <a:t>E.g</a:t>
+            </a:r>
+            <a:r>
+              <a:rPr lang="fr-FR" dirty="0"/>
+              <a:t> 4/5 of </a:t>
+            </a:r>
+            <a:r>
+              <a:rPr lang="fr-FR" dirty="0" err="1"/>
+              <a:t>workers</a:t>
+            </a:r>
+            <a:r>
+              <a:rPr lang="fr-FR" dirty="0"/>
+              <a:t> </a:t>
+            </a:r>
+            <a:r>
+              <a:rPr lang="fr-FR" dirty="0" err="1"/>
+              <a:t>send</a:t>
+            </a:r>
+            <a:r>
+              <a:rPr lang="fr-FR" dirty="0"/>
+              <a:t> correct </a:t>
+            </a:r>
+            <a:r>
+              <a:rPr lang="fr-FR" dirty="0" err="1"/>
+              <a:t>weights</a:t>
+            </a:r>
+            <a:r>
+              <a:rPr lang="fr-FR" dirty="0"/>
+              <a:t> (</a:t>
+            </a:r>
+            <a:r>
+              <a:rPr lang="fr-FR" dirty="0" err="1"/>
+              <a:t>this</a:t>
+            </a:r>
+            <a:r>
+              <a:rPr lang="fr-FR" dirty="0"/>
+              <a:t> </a:t>
+            </a:r>
+            <a:r>
+              <a:rPr lang="fr-FR" dirty="0" err="1"/>
+              <a:t>number</a:t>
+            </a:r>
+            <a:r>
+              <a:rPr lang="fr-FR" dirty="0"/>
+              <a:t> can </a:t>
+            </a:r>
+            <a:r>
+              <a:rPr lang="fr-FR" dirty="0" err="1"/>
+              <a:t>be</a:t>
+            </a:r>
+            <a:r>
+              <a:rPr lang="fr-FR" dirty="0"/>
+              <a:t> </a:t>
+            </a:r>
+            <a:r>
+              <a:rPr lang="fr-FR" dirty="0" err="1"/>
+              <a:t>changed</a:t>
+            </a:r>
+            <a:endParaRPr lang="fr-FR" dirty="0"/>
+          </a:p>
+          <a:p>
+            <a:pPr lvl="1"/>
+            <a:r>
+              <a:rPr lang="fr-FR" dirty="0" err="1"/>
+              <a:t>Validity</a:t>
+            </a:r>
+            <a:r>
+              <a:rPr lang="fr-FR" dirty="0"/>
+              <a:t> of arguments </a:t>
+            </a:r>
+            <a:r>
+              <a:rPr lang="fr-FR" dirty="0" err="1"/>
+              <a:t>tested</a:t>
+            </a:r>
+            <a:r>
+              <a:rPr lang="fr-FR" dirty="0"/>
+              <a:t> </a:t>
+            </a:r>
+            <a:r>
+              <a:rPr lang="fr-FR" dirty="0" err="1"/>
+              <a:t>using</a:t>
+            </a:r>
+            <a:r>
+              <a:rPr lang="fr-FR" dirty="0"/>
+              <a:t> </a:t>
+            </a:r>
+            <a:r>
+              <a:rPr lang="fr-FR" dirty="0" err="1"/>
+              <a:t>infinite</a:t>
+            </a:r>
+            <a:r>
+              <a:rPr lang="fr-FR" dirty="0"/>
+              <a:t> </a:t>
+            </a:r>
+            <a:r>
+              <a:rPr lang="fr-FR" dirty="0" err="1"/>
+              <a:t>loop</a:t>
+            </a:r>
+            <a:endParaRPr lang="fr-FR" dirty="0"/>
           </a:p>
         </p:txBody>
       </p:sp>
     </p:spTree>
     <p:extLst>
       <p:ext uri="{BB962C8B-B14F-4D97-AF65-F5344CB8AC3E}">
-        <p14:creationId xmlns:p14="http://schemas.microsoft.com/office/powerpoint/2010/main" val="905150595"/>
+        <p14:creationId xmlns:p14="http://schemas.microsoft.com/office/powerpoint/2010/main" val="739893043"/>
       </p:ext>
     </p:extLst>
   </p:cSld>
@@ -4713,7 +5919,7 @@
           <p:cNvPr id="2" name="Titre 1">
             <a:extLst>
               <a:ext uri="{FF2B5EF4-FFF2-40B4-BE49-F238E27FC236}">
-                <a16:creationId xmlns:a16="http://schemas.microsoft.com/office/drawing/2014/main" id="{58DE3A8F-BB7F-8AB8-59F6-C45B337CABFF}"/>
+                <a16:creationId xmlns:a16="http://schemas.microsoft.com/office/drawing/2014/main" id="{B2B2E252-EC39-BBF1-C258-3539F0215A0A}"/>
               </a:ext>
             </a:extLst>
           </p:cNvPr>
@@ -4730,8 +5936,28 @@
           <a:lstStyle/>
           <a:p>
             <a:r>
-              <a:rPr lang="en-GB" dirty="0"/>
-              <a:t>Now more realistic case of ML </a:t>
+              <a:rPr lang="fr-FR" dirty="0" err="1"/>
+              <a:t>What</a:t>
+            </a:r>
+            <a:r>
+              <a:rPr lang="fr-FR" dirty="0"/>
+              <a:t> </a:t>
+            </a:r>
+            <a:r>
+              <a:rPr lang="fr-FR" dirty="0" err="1"/>
+              <a:t>we</a:t>
+            </a:r>
+            <a:r>
+              <a:rPr lang="fr-FR" dirty="0"/>
+              <a:t> </a:t>
+            </a:r>
+            <a:r>
+              <a:rPr lang="fr-FR" dirty="0" err="1"/>
+              <a:t>want</a:t>
+            </a:r>
+            <a:r>
+              <a:rPr lang="fr-FR" dirty="0"/>
+              <a:t> to show</a:t>
             </a:r>
           </a:p>
         </p:txBody>
@@ -4741,7 +5967,7 @@
           <p:cNvPr id="3" name="Espace réservé du contenu 2">
             <a:extLst>
               <a:ext uri="{FF2B5EF4-FFF2-40B4-BE49-F238E27FC236}">
-                <a16:creationId xmlns:a16="http://schemas.microsoft.com/office/drawing/2014/main" id="{9C4D13AF-DE08-94B6-D33C-6ED1674A9EB8}"/>
+                <a16:creationId xmlns:a16="http://schemas.microsoft.com/office/drawing/2014/main" id="{DE60CF21-9826-BC34-5AA4-8FB451AD529D}"/>
               </a:ext>
             </a:extLst>
           </p:cNvPr>
@@ -4752,12 +5978,7 @@
             <p:ph idx="1"/>
           </p:nvPr>
         </p:nvSpPr>
-        <p:spPr>
-          <a:xfrm>
-            <a:off x="838200" y="1390389"/>
-            <a:ext cx="10515600" cy="4786574"/>
-          </a:xfrm>
-        </p:spPr>
+        <p:spPr/>
         <p:txBody>
           <a:bodyPr>
             <a:normAutofit fontScale="92500" lnSpcReduction="10000"/>
@@ -4765,105 +5986,591 @@
           <a:lstStyle/>
           <a:p>
             <a:r>
-              <a:rPr lang="en-GB" dirty="0"/>
-              <a:t>Does 1 + 1 = 3 on Quorum ? NN to compute a + b</a:t>
+              <a:rPr lang="fr-FR" dirty="0"/>
+              <a:t>Can </a:t>
+            </a:r>
+            <a:r>
+              <a:rPr lang="fr-FR" dirty="0" err="1"/>
+              <a:t>we</a:t>
+            </a:r>
+            <a:r>
+              <a:rPr lang="fr-FR" dirty="0"/>
+              <a:t> use blockchain to </a:t>
+            </a:r>
+            <a:r>
+              <a:rPr lang="fr-FR" dirty="0" err="1"/>
+              <a:t>perform</a:t>
+            </a:r>
+            <a:r>
+              <a:rPr lang="fr-FR" dirty="0"/>
+              <a:t> </a:t>
+            </a:r>
+            <a:r>
+              <a:rPr lang="fr-FR" dirty="0" err="1"/>
+              <a:t>distributed</a:t>
+            </a:r>
+            <a:r>
+              <a:rPr lang="fr-FR" dirty="0"/>
+              <a:t> ML ? </a:t>
+            </a:r>
+          </a:p>
+          <a:p>
+            <a:r>
+              <a:rPr lang="fr-FR" dirty="0"/>
+              <a:t>This </a:t>
+            </a:r>
+            <a:r>
+              <a:rPr lang="fr-FR" dirty="0" err="1"/>
+              <a:t>means</a:t>
+            </a:r>
+            <a:r>
+              <a:rPr lang="fr-FR" dirty="0"/>
+              <a:t>:</a:t>
             </a:r>
           </a:p>
           <a:p>
             <a:pPr lvl="1"/>
             <a:r>
-              <a:rPr lang="en-GB" dirty="0"/>
-              <a:t>9 parameters (encoded as int)</a:t>
+              <a:rPr lang="fr-FR" dirty="0" err="1"/>
+              <a:t>Send</a:t>
+            </a:r>
+            <a:r>
+              <a:rPr lang="fr-FR" dirty="0"/>
+              <a:t> model </a:t>
+            </a:r>
+            <a:r>
+              <a:rPr lang="fr-FR" dirty="0" err="1"/>
+              <a:t>weights</a:t>
+            </a:r>
+            <a:r>
+              <a:rPr lang="fr-FR" dirty="0"/>
+              <a:t> over blockchain (in </a:t>
+            </a:r>
+            <a:r>
+              <a:rPr lang="fr-FR" dirty="0" err="1"/>
+              <a:t>order</a:t>
+            </a:r>
+            <a:r>
+              <a:rPr lang="fr-FR" dirty="0"/>
+              <a:t> to </a:t>
+            </a:r>
+            <a:r>
+              <a:rPr lang="fr-FR" dirty="0" err="1"/>
+              <a:t>aggregate</a:t>
+            </a:r>
+            <a:r>
+              <a:rPr lang="fr-FR" dirty="0"/>
+              <a:t> </a:t>
+            </a:r>
+            <a:r>
+              <a:rPr lang="fr-FR" dirty="0" err="1"/>
+              <a:t>results</a:t>
+            </a:r>
+            <a:r>
+              <a:rPr lang="fr-FR" dirty="0"/>
+              <a:t>)</a:t>
             </a:r>
           </a:p>
           <a:p>
             <a:pPr lvl="1"/>
             <a:r>
-              <a:rPr lang="en-GB" dirty="0"/>
-              <a:t>TODO add plot</a:t>
-            </a:r>
-          </a:p>
-          <a:p>
-            <a:pPr marL="457200" lvl="1" indent="0">
-              <a:buNone/>
-            </a:pPr>
-            <a:endParaRPr lang="en-GB" dirty="0"/>
-          </a:p>
-          <a:p>
-            <a:r>
-              <a:rPr lang="en-GB" dirty="0"/>
-              <a:t>MNIST using CNN.</a:t>
+              <a:rPr lang="fr-FR" dirty="0" err="1"/>
+              <a:t>Verify</a:t>
+            </a:r>
+            <a:r>
+              <a:rPr lang="fr-FR" dirty="0"/>
+              <a:t> </a:t>
+            </a:r>
+            <a:r>
+              <a:rPr lang="fr-FR" dirty="0" err="1"/>
+              <a:t>that</a:t>
+            </a:r>
+            <a:r>
+              <a:rPr lang="fr-FR" dirty="0"/>
+              <a:t> </a:t>
+            </a:r>
+            <a:r>
+              <a:rPr lang="fr-FR" dirty="0" err="1"/>
+              <a:t>weights</a:t>
+            </a:r>
+            <a:r>
+              <a:rPr lang="fr-FR" dirty="0"/>
+              <a:t> are correct</a:t>
             </a:r>
           </a:p>
           <a:p>
             <a:pPr lvl="1"/>
             <a:r>
-              <a:rPr lang="en-GB" dirty="0"/>
-              <a:t>~ 1.6 millions of parameters (we encode them as int for simplicity)</a:t>
-            </a:r>
-          </a:p>
-          <a:p>
-            <a:pPr lvl="1"/>
-            <a:r>
-              <a:rPr lang="en-GB" dirty="0"/>
-              <a:t>TODO add plot of latency and % commit</a:t>
-            </a:r>
-          </a:p>
-          <a:p>
-            <a:pPr lvl="1"/>
-            <a:endParaRPr lang="en-GB" dirty="0"/>
-          </a:p>
-          <a:p>
-            <a:r>
-              <a:rPr lang="en-GB" dirty="0"/>
-              <a:t>BERT Base: </a:t>
-            </a:r>
-          </a:p>
-          <a:p>
-            <a:pPr lvl="1"/>
-            <a:r>
-              <a:rPr lang="en-GB" dirty="0"/>
-              <a:t>~ 110 millions of parameters (encoded as ?</a:t>
-            </a:r>
-            <a:r>
-              <a:rPr lang="en-GB" dirty="0" err="1"/>
-              <a:t>uint</a:t>
-            </a:r>
-            <a:r>
-              <a:rPr lang="en-GB" dirty="0"/>
+              <a:rPr lang="fr-FR" dirty="0" err="1"/>
+              <a:t>Consequences</a:t>
+            </a:r>
+            <a:r>
+              <a:rPr lang="fr-FR" dirty="0"/>
+              <a:t>: Model </a:t>
+            </a:r>
+            <a:r>
+              <a:rPr lang="fr-FR" dirty="0" err="1"/>
+              <a:t>statisticaly</a:t>
+            </a:r>
+            <a:r>
+              <a:rPr lang="fr-FR" dirty="0"/>
+              <a:t> </a:t>
+            </a:r>
+            <a:r>
+              <a:rPr lang="fr-FR" dirty="0" err="1"/>
+              <a:t>resilient</a:t>
+            </a:r>
+            <a:r>
+              <a:rPr lang="fr-FR" dirty="0"/>
+              <a:t> to </a:t>
+            </a:r>
+            <a:r>
+              <a:rPr lang="fr-FR" dirty="0" err="1"/>
+              <a:t>bizantine</a:t>
+            </a:r>
+            <a:r>
+              <a:rPr lang="fr-FR" dirty="0"/>
+              <a:t> </a:t>
+            </a:r>
+            <a:r>
+              <a:rPr lang="fr-FR" dirty="0" err="1"/>
+              <a:t>attack</a:t>
+            </a:r>
+            <a:r>
+              <a:rPr lang="fr-FR" dirty="0"/>
+              <a:t>, </a:t>
+            </a:r>
+            <a:r>
+              <a:rPr lang="fr-FR" dirty="0" err="1"/>
+              <a:t>only</a:t>
+            </a:r>
+            <a:r>
+              <a:rPr lang="fr-FR" dirty="0"/>
+              <a:t> </a:t>
+            </a:r>
+            <a:r>
+              <a:rPr lang="fr-FR" dirty="0" err="1"/>
+              <a:t>based</a:t>
+            </a:r>
+            <a:r>
+              <a:rPr lang="fr-FR" dirty="0"/>
+              <a:t> on the </a:t>
+            </a:r>
+            <a:r>
+              <a:rPr lang="fr-FR" dirty="0" err="1"/>
+              <a:t>fact</a:t>
+            </a:r>
+            <a:r>
+              <a:rPr lang="fr-FR" dirty="0"/>
+              <a:t> </a:t>
+            </a:r>
+            <a:r>
+              <a:rPr lang="en-GB" dirty="0"/>
+              <a:t>that</a:t>
+            </a:r>
+            <a:r>
+              <a:rPr lang="fr-FR" dirty="0"/>
+              <a:t> </a:t>
+            </a:r>
+            <a:r>
+              <a:rPr lang="fr-FR" dirty="0" err="1"/>
+              <a:t>we</a:t>
+            </a:r>
+            <a:r>
+              <a:rPr lang="fr-FR" dirty="0"/>
+              <a:t> assume &gt; 50% correct </a:t>
+            </a:r>
+            <a:r>
+              <a:rPr lang="fr-FR" dirty="0" err="1"/>
+              <a:t>workers</a:t>
+            </a:r>
+            <a:r>
+              <a:rPr lang="fr-FR" dirty="0"/>
+              <a:t> in a pool (</a:t>
+            </a:r>
+            <a:r>
+              <a:rPr lang="fr-FR" dirty="0" err="1"/>
+              <a:t>i.e</a:t>
+            </a:r>
+            <a:r>
+              <a:rPr lang="fr-FR" dirty="0"/>
+              <a:t> </a:t>
+            </a:r>
+            <a:r>
+              <a:rPr lang="fr-FR" dirty="0" err="1"/>
+              <a:t>same</a:t>
+            </a:r>
+            <a:r>
+              <a:rPr lang="fr-FR" dirty="0"/>
+              <a:t> </a:t>
+            </a:r>
+            <a:r>
+              <a:rPr lang="fr-FR" dirty="0" err="1"/>
+              <a:t>learning</a:t>
+            </a:r>
+            <a:r>
+              <a:rPr lang="fr-FR" dirty="0"/>
+              <a:t> </a:t>
+            </a:r>
+            <a:r>
+              <a:rPr lang="fr-FR" dirty="0" err="1"/>
+              <a:t>task</a:t>
+            </a:r>
+            <a:r>
+              <a:rPr lang="fr-FR" dirty="0"/>
               <a:t>)</a:t>
             </a:r>
           </a:p>
           <a:p>
-            <a:pPr lvl="1"/>
-            <a:endParaRPr lang="en-GB" dirty="0"/>
-          </a:p>
-          <a:p>
-            <a:r>
-              <a:rPr lang="en-GB" dirty="0"/>
-              <a:t>TODO encoded weight as ?</a:t>
-            </a:r>
-            <a:r>
-              <a:rPr lang="en-GB" dirty="0" err="1"/>
-              <a:t>uint</a:t>
-            </a:r>
-            <a:r>
-              <a:rPr lang="en-GB" dirty="0"/>
-              <a:t>. In order to have same order of magnitude than floats</a:t>
-            </a:r>
-          </a:p>
-          <a:p>
-            <a:pPr marL="457200" lvl="1" indent="0">
-              <a:buNone/>
-            </a:pPr>
-            <a:endParaRPr lang="en-GB" dirty="0"/>
+            <a:r>
+              <a:rPr lang="fr-FR" dirty="0"/>
+              <a:t>Assumptions: </a:t>
+            </a:r>
+            <a:r>
+              <a:rPr lang="fr-FR" dirty="0" err="1"/>
+              <a:t>We</a:t>
+            </a:r>
+            <a:r>
+              <a:rPr lang="fr-FR" dirty="0"/>
+              <a:t> </a:t>
+            </a:r>
+            <a:r>
+              <a:rPr lang="fr-FR" dirty="0" err="1"/>
+              <a:t>perform</a:t>
+            </a:r>
+            <a:r>
+              <a:rPr lang="fr-FR" dirty="0"/>
+              <a:t> «Fake» </a:t>
+            </a:r>
+            <a:r>
+              <a:rPr lang="fr-FR" dirty="0" err="1"/>
+              <a:t>learning</a:t>
+            </a:r>
+            <a:r>
+              <a:rPr lang="fr-FR" dirty="0"/>
+              <a:t>. </a:t>
+            </a:r>
+            <a:r>
+              <a:rPr lang="fr-FR" dirty="0" err="1"/>
+              <a:t>I.e</a:t>
+            </a:r>
+            <a:r>
+              <a:rPr lang="fr-FR" dirty="0"/>
+              <a:t> </a:t>
+            </a:r>
+            <a:r>
+              <a:rPr lang="fr-FR" dirty="0" err="1"/>
+              <a:t>workers</a:t>
+            </a:r>
+            <a:r>
+              <a:rPr lang="fr-FR" dirty="0"/>
+              <a:t> download </a:t>
+            </a:r>
+            <a:r>
+              <a:rPr lang="fr-FR" dirty="0" err="1"/>
+              <a:t>weights</a:t>
+            </a:r>
+            <a:r>
+              <a:rPr lang="fr-FR" dirty="0"/>
+              <a:t> of the correct </a:t>
+            </a:r>
+            <a:r>
+              <a:rPr lang="fr-FR" dirty="0" err="1"/>
+              <a:t>length</a:t>
+            </a:r>
+            <a:r>
+              <a:rPr lang="fr-FR" dirty="0"/>
+              <a:t>, but </a:t>
+            </a:r>
+            <a:r>
+              <a:rPr lang="fr-FR" dirty="0" err="1"/>
+              <a:t>actually</a:t>
+            </a:r>
+            <a:r>
+              <a:rPr lang="fr-FR" dirty="0"/>
+              <a:t> </a:t>
+            </a:r>
+            <a:r>
+              <a:rPr lang="fr-FR" dirty="0" err="1"/>
+              <a:t>just</a:t>
+            </a:r>
+            <a:r>
+              <a:rPr lang="fr-FR" dirty="0"/>
+              <a:t> </a:t>
+            </a:r>
+            <a:r>
+              <a:rPr lang="fr-FR" dirty="0" err="1"/>
+              <a:t>wait</a:t>
+            </a:r>
+            <a:r>
+              <a:rPr lang="fr-FR" dirty="0"/>
+              <a:t> </a:t>
+            </a:r>
+            <a:r>
+              <a:rPr lang="fr-FR" dirty="0" err="1"/>
+              <a:t>some</a:t>
+            </a:r>
+            <a:r>
+              <a:rPr lang="fr-FR" dirty="0"/>
+              <a:t> time to </a:t>
+            </a:r>
+            <a:r>
+              <a:rPr lang="fr-FR" dirty="0" err="1"/>
+              <a:t>simulate</a:t>
+            </a:r>
+            <a:r>
+              <a:rPr lang="fr-FR" dirty="0"/>
+              <a:t> a </a:t>
+            </a:r>
+            <a:r>
+              <a:rPr lang="fr-FR" dirty="0" err="1"/>
+              <a:t>learning</a:t>
+            </a:r>
+            <a:r>
+              <a:rPr lang="fr-FR" dirty="0"/>
+              <a:t> phase, and </a:t>
+            </a:r>
+            <a:r>
+              <a:rPr lang="fr-FR" dirty="0" err="1"/>
+              <a:t>then</a:t>
+            </a:r>
+            <a:r>
+              <a:rPr lang="fr-FR" dirty="0"/>
+              <a:t> </a:t>
+            </a:r>
+            <a:r>
+              <a:rPr lang="fr-FR" dirty="0" err="1"/>
+              <a:t>send</a:t>
+            </a:r>
+            <a:r>
+              <a:rPr lang="fr-FR" dirty="0"/>
+              <a:t> </a:t>
+            </a:r>
+            <a:r>
+              <a:rPr lang="fr-FR" dirty="0" err="1"/>
+              <a:t>either</a:t>
+            </a:r>
+            <a:r>
+              <a:rPr lang="fr-FR" dirty="0"/>
+              <a:t> «Correct» </a:t>
+            </a:r>
+            <a:r>
+              <a:rPr lang="fr-FR" dirty="0" err="1"/>
+              <a:t>weights</a:t>
+            </a:r>
+            <a:r>
+              <a:rPr lang="fr-FR" dirty="0"/>
+              <a:t> – in </a:t>
+            </a:r>
+            <a:r>
+              <a:rPr lang="fr-FR" dirty="0" err="1"/>
+              <a:t>order</a:t>
+            </a:r>
+            <a:r>
+              <a:rPr lang="fr-FR" dirty="0"/>
+              <a:t> to have a </a:t>
+            </a:r>
+            <a:r>
+              <a:rPr lang="fr-FR" dirty="0" err="1"/>
+              <a:t>majority</a:t>
+            </a:r>
+            <a:r>
+              <a:rPr lang="fr-FR" dirty="0"/>
+              <a:t> of </a:t>
+            </a:r>
+            <a:r>
+              <a:rPr lang="fr-FR" dirty="0" err="1"/>
+              <a:t>similar</a:t>
+            </a:r>
+            <a:r>
+              <a:rPr lang="fr-FR" dirty="0"/>
+              <a:t> </a:t>
+            </a:r>
+            <a:r>
+              <a:rPr lang="fr-FR" dirty="0" err="1"/>
+              <a:t>weight</a:t>
+            </a:r>
+            <a:r>
+              <a:rPr lang="fr-FR" dirty="0"/>
+              <a:t>, or </a:t>
+            </a:r>
+            <a:r>
+              <a:rPr lang="fr-FR" dirty="0" err="1"/>
+              <a:t>bad</a:t>
+            </a:r>
+            <a:r>
+              <a:rPr lang="fr-FR" dirty="0"/>
+              <a:t> </a:t>
+            </a:r>
+            <a:r>
+              <a:rPr lang="fr-FR" dirty="0" err="1"/>
+              <a:t>weights</a:t>
+            </a:r>
+            <a:r>
+              <a:rPr lang="fr-FR" dirty="0"/>
+              <a:t> (</a:t>
+            </a:r>
+            <a:r>
+              <a:rPr lang="fr-FR" dirty="0" err="1"/>
+              <a:t>rdm</a:t>
+            </a:r>
+            <a:r>
+              <a:rPr lang="fr-FR" dirty="0"/>
+              <a:t> </a:t>
+            </a:r>
+            <a:r>
+              <a:rPr lang="fr-FR" dirty="0" err="1"/>
+              <a:t>numbers</a:t>
+            </a:r>
+            <a:r>
+              <a:rPr lang="fr-FR" dirty="0"/>
+              <a:t>))</a:t>
+            </a:r>
+          </a:p>
+          <a:p>
+            <a:r>
+              <a:rPr lang="fr-FR" dirty="0" err="1"/>
+              <a:t>We</a:t>
+            </a:r>
+            <a:r>
+              <a:rPr lang="fr-FR" dirty="0"/>
+              <a:t> </a:t>
+            </a:r>
+            <a:r>
+              <a:rPr lang="fr-FR" dirty="0" err="1"/>
+              <a:t>also</a:t>
+            </a:r>
+            <a:r>
+              <a:rPr lang="fr-FR" dirty="0"/>
+              <a:t> </a:t>
+            </a:r>
+            <a:r>
+              <a:rPr lang="fr-FR" dirty="0" err="1"/>
+              <a:t>don’t</a:t>
+            </a:r>
+            <a:r>
+              <a:rPr lang="fr-FR" dirty="0"/>
+              <a:t> </a:t>
+            </a:r>
+            <a:r>
+              <a:rPr lang="fr-FR" dirty="0" err="1"/>
+              <a:t>aggregate</a:t>
+            </a:r>
+            <a:r>
+              <a:rPr lang="fr-FR" dirty="0"/>
+              <a:t> </a:t>
+            </a:r>
+            <a:r>
+              <a:rPr lang="fr-FR" dirty="0" err="1"/>
+              <a:t>result</a:t>
+            </a:r>
+            <a:r>
+              <a:rPr lang="fr-FR" dirty="0"/>
+              <a:t> of the </a:t>
+            </a:r>
+            <a:r>
+              <a:rPr lang="fr-FR" dirty="0" err="1"/>
+              <a:t>federated</a:t>
+            </a:r>
+            <a:r>
+              <a:rPr lang="fr-FR" dirty="0"/>
+              <a:t> </a:t>
+            </a:r>
+            <a:r>
+              <a:rPr lang="fr-FR" dirty="0" err="1"/>
+              <a:t>learning</a:t>
+            </a:r>
+            <a:r>
+              <a:rPr lang="fr-FR" dirty="0"/>
+              <a:t>, </a:t>
+            </a:r>
+            <a:r>
+              <a:rPr lang="fr-FR" dirty="0" err="1"/>
+              <a:t>i.e</a:t>
+            </a:r>
+            <a:r>
+              <a:rPr lang="fr-FR" dirty="0"/>
+              <a:t> </a:t>
+            </a:r>
+            <a:r>
+              <a:rPr lang="fr-FR" dirty="0" err="1"/>
+              <a:t>next</a:t>
+            </a:r>
+            <a:r>
+              <a:rPr lang="fr-FR" dirty="0"/>
+              <a:t> </a:t>
+            </a:r>
+            <a:r>
+              <a:rPr lang="fr-FR" dirty="0" err="1"/>
+              <a:t>learning</a:t>
+            </a:r>
+            <a:r>
+              <a:rPr lang="fr-FR" dirty="0"/>
+              <a:t> </a:t>
+            </a:r>
+            <a:r>
+              <a:rPr lang="fr-FR" dirty="0" err="1"/>
+              <a:t>task</a:t>
+            </a:r>
+            <a:r>
+              <a:rPr lang="fr-FR" dirty="0"/>
+              <a:t> </a:t>
+            </a:r>
+            <a:r>
+              <a:rPr lang="fr-FR" dirty="0" err="1"/>
+              <a:t>weight</a:t>
+            </a:r>
+            <a:r>
+              <a:rPr lang="fr-FR" dirty="0"/>
+              <a:t> </a:t>
+            </a:r>
+            <a:r>
+              <a:rPr lang="fr-FR" dirty="0" err="1"/>
+              <a:t>isn’t</a:t>
+            </a:r>
+            <a:r>
+              <a:rPr lang="fr-FR" dirty="0"/>
+              <a:t> </a:t>
+            </a:r>
+            <a:r>
+              <a:rPr lang="fr-FR" dirty="0" err="1"/>
+              <a:t>obtained</a:t>
+            </a:r>
+            <a:r>
+              <a:rPr lang="fr-FR" dirty="0"/>
+              <a:t> </a:t>
+            </a:r>
+            <a:r>
+              <a:rPr lang="fr-FR" dirty="0" err="1"/>
+              <a:t>from</a:t>
+            </a:r>
+            <a:r>
+              <a:rPr lang="fr-FR" dirty="0"/>
+              <a:t> </a:t>
+            </a:r>
+            <a:r>
+              <a:rPr lang="fr-FR" dirty="0" err="1"/>
+              <a:t>previous</a:t>
+            </a:r>
+            <a:r>
+              <a:rPr lang="fr-FR" dirty="0"/>
+              <a:t> </a:t>
+            </a:r>
+            <a:r>
+              <a:rPr lang="fr-FR" dirty="0" err="1"/>
+              <a:t>results</a:t>
+            </a:r>
+            <a:r>
+              <a:rPr lang="fr-FR" dirty="0"/>
+              <a:t>.  </a:t>
+            </a:r>
           </a:p>
         </p:txBody>
       </p:sp>
     </p:spTree>
     <p:extLst>
       <p:ext uri="{BB962C8B-B14F-4D97-AF65-F5344CB8AC3E}">
-        <p14:creationId xmlns:p14="http://schemas.microsoft.com/office/powerpoint/2010/main" val="2302859776"/>
+        <p14:creationId xmlns:p14="http://schemas.microsoft.com/office/powerpoint/2010/main" val="1161397255"/>
       </p:ext>
     </p:extLst>
   </p:cSld>
@@ -4895,7 +6602,7 @@
           <p:cNvPr id="2" name="Titre 1">
             <a:extLst>
               <a:ext uri="{FF2B5EF4-FFF2-40B4-BE49-F238E27FC236}">
-                <a16:creationId xmlns:a16="http://schemas.microsoft.com/office/drawing/2014/main" id="{8697D98F-4B1D-9648-BEA5-A23BB09532E0}"/>
+                <a16:creationId xmlns:a16="http://schemas.microsoft.com/office/drawing/2014/main" id="{D4EEC784-13C4-371B-94EB-9323C955F356}"/>
               </a:ext>
             </a:extLst>
           </p:cNvPr>
@@ -4913,7 +6620,7 @@
           <a:p>
             <a:r>
               <a:rPr lang="en-GB" dirty="0"/>
-              <a:t>Node analysis</a:t>
+              <a:t>Our workers:</a:t>
             </a:r>
           </a:p>
         </p:txBody>
@@ -4923,7 +6630,7 @@
           <p:cNvPr id="3" name="Espace réservé du contenu 2">
             <a:extLst>
               <a:ext uri="{FF2B5EF4-FFF2-40B4-BE49-F238E27FC236}">
-                <a16:creationId xmlns:a16="http://schemas.microsoft.com/office/drawing/2014/main" id="{F0C927BA-48FE-6F0A-4254-9CCB17C73780}"/>
+                <a16:creationId xmlns:a16="http://schemas.microsoft.com/office/drawing/2014/main" id="{F1325B1F-711A-66C2-9C23-2294A16C514F}"/>
               </a:ext>
             </a:extLst>
           </p:cNvPr>
@@ -4934,49 +6641,40 @@
             <p:ph idx="1"/>
           </p:nvPr>
         </p:nvSpPr>
-        <p:spPr>
-          <a:xfrm>
-            <a:off x="838200" y="1825625"/>
-            <a:ext cx="10515600" cy="2696271"/>
-          </a:xfrm>
-        </p:spPr>
+        <p:spPr/>
         <p:txBody>
           <a:bodyPr/>
           <a:lstStyle/>
           <a:p>
             <a:r>
               <a:rPr lang="en-GB" dirty="0"/>
-              <a:t>In previous case, does nodes of blockchain are actually </a:t>
-            </a:r>
-            <a:r>
-              <a:rPr lang="en-GB" dirty="0" err="1"/>
-              <a:t>overwelmed</a:t>
-            </a:r>
-            <a:r>
-              <a:rPr lang="en-GB" dirty="0"/>
-              <a:t> by memory or </a:t>
-            </a:r>
-            <a:r>
-              <a:rPr lang="en-GB" dirty="0" err="1"/>
-              <a:t>cpu</a:t>
-            </a:r>
-            <a:r>
-              <a:rPr lang="en-GB" dirty="0"/>
-              <a:t> or both ? </a:t>
-            </a:r>
-          </a:p>
-          <a:p>
-            <a:r>
-              <a:rPr lang="en-GB" dirty="0"/>
-              <a:t>Conclude with this result if Blockchain could be used for high computation demanding task but with low memory or high memory but with low </a:t>
-            </a:r>
-            <a:r>
-              <a:rPr lang="en-GB" dirty="0" err="1"/>
-              <a:t>cpu</a:t>
-            </a:r>
-            <a:r>
-              <a:rPr lang="en-GB" dirty="0"/>
-              <a:t> usage</a:t>
+              <a:t>Each of our worker will have an estimated power of:</a:t>
+            </a:r>
+          </a:p>
+          <a:p>
+            <a:pPr lvl="1"/>
+            <a:r>
+              <a:rPr lang="en-GB" dirty="0"/>
+              <a:t>CPU = ???</a:t>
+            </a:r>
+          </a:p>
+          <a:p>
+            <a:pPr lvl="1"/>
+            <a:r>
+              <a:rPr lang="en-GB" dirty="0"/>
+              <a:t>Memory = ??? </a:t>
+            </a:r>
+          </a:p>
+          <a:p>
+            <a:r>
+              <a:rPr lang="en-GB" dirty="0"/>
+              <a:t>This is important if we want to simulate the learning time for one iteration of MNIST-with-CNN/BERT</a:t>
+            </a:r>
+          </a:p>
+          <a:p>
+            <a:r>
+              <a:rPr lang="en-GB" dirty="0"/>
+              <a:t>OR we can ignore the learning time, and just send all updated models at the same time, or over a short time period.</a:t>
             </a:r>
           </a:p>
         </p:txBody>
@@ -4984,7 +6682,7 @@
     </p:spTree>
     <p:extLst>
       <p:ext uri="{BB962C8B-B14F-4D97-AF65-F5344CB8AC3E}">
-        <p14:creationId xmlns:p14="http://schemas.microsoft.com/office/powerpoint/2010/main" val="234382791"/>
+        <p14:creationId xmlns:p14="http://schemas.microsoft.com/office/powerpoint/2010/main" val="1592916139"/>
       </p:ext>
     </p:extLst>
   </p:cSld>
@@ -5016,7 +6714,7 @@
           <p:cNvPr id="2" name="Titre 1">
             <a:extLst>
               <a:ext uri="{FF2B5EF4-FFF2-40B4-BE49-F238E27FC236}">
-                <a16:creationId xmlns:a16="http://schemas.microsoft.com/office/drawing/2014/main" id="{85F3F46D-1DBB-7001-71DF-A5665483C9E2}"/>
+                <a16:creationId xmlns:a16="http://schemas.microsoft.com/office/drawing/2014/main" id="{0FA9D487-E3F2-350C-D9CB-A2F3902234C0}"/>
               </a:ext>
             </a:extLst>
           </p:cNvPr>
@@ -5027,73 +6725,20 @@
             <p:ph type="title"/>
           </p:nvPr>
         </p:nvSpPr>
-        <p:spPr/>
+        <p:spPr>
+          <a:xfrm>
+            <a:off x="968829" y="2766218"/>
+            <a:ext cx="10515600" cy="1325563"/>
+          </a:xfrm>
+        </p:spPr>
         <p:txBody>
           <a:bodyPr/>
           <a:lstStyle/>
           <a:p>
-            <a:r>
-              <a:rPr lang="en-GB" dirty="0"/>
-              <a:t>The holy grail: CHAT-GPT3</a:t>
-            </a:r>
-          </a:p>
-        </p:txBody>
-      </p:sp>
-      <p:sp>
-        <p:nvSpPr>
-          <p:cNvPr id="3" name="Espace réservé du contenu 2">
-            <a:extLst>
-              <a:ext uri="{FF2B5EF4-FFF2-40B4-BE49-F238E27FC236}">
-                <a16:creationId xmlns:a16="http://schemas.microsoft.com/office/drawing/2014/main" id="{3E63DE52-EF4B-57C2-3FD9-191C52188163}"/>
-              </a:ext>
-            </a:extLst>
-          </p:cNvPr>
-          <p:cNvSpPr>
-            <a:spLocks noGrp="1"/>
-          </p:cNvSpPr>
-          <p:nvPr>
-            <p:ph idx="1"/>
-          </p:nvPr>
-        </p:nvSpPr>
-        <p:spPr/>
-        <p:txBody>
-          <a:bodyPr>
-            <a:normAutofit lnSpcReduction="10000"/>
-          </a:bodyPr>
-          <a:lstStyle/>
-          <a:p>
-            <a:r>
-              <a:rPr lang="en-GB" dirty="0"/>
-              <a:t>Requires lots of computational resources and memory </a:t>
-            </a:r>
-          </a:p>
-          <a:p>
-            <a:r>
-              <a:rPr lang="en-GB" dirty="0"/>
-              <a:t>Can we actually store GPT3 model on the blockchain ? </a:t>
-            </a:r>
-          </a:p>
-          <a:p>
-            <a:r>
-              <a:rPr lang="en-GB" dirty="0"/>
-              <a:t>Can blockchain handle the huge amount of memory </a:t>
-            </a:r>
-            <a:r>
-              <a:rPr lang="en-GB" dirty="0" err="1"/>
-              <a:t>exhcnaged</a:t>
-            </a:r>
-            <a:r>
-              <a:rPr lang="en-GB" dirty="0"/>
-              <a:t> to learn CHAT-GPT3 ? </a:t>
-            </a:r>
-          </a:p>
-          <a:p>
-            <a:endParaRPr lang="en-GB" dirty="0"/>
-          </a:p>
-          <a:p>
-            <a:r>
-              <a:rPr lang="en-GB" dirty="0"/>
-              <a:t>Note: in our smart contract, we send an encrypted version of the model which is as long as the model, what about hashing the model weights (but need to make sure we can still proof the worker’s work and still need to send model’s weights in clear after consensus reached)? Could impact performances, to explore…</a:t>
+            <a:pPr algn="ctr"/>
+            <a:r>
+              <a:rPr lang="en-GB" dirty="0"/>
+              <a:t>Testing part......</a:t>
             </a:r>
           </a:p>
         </p:txBody>
@@ -5101,7 +6746,7 @@
     </p:spTree>
     <p:extLst>
       <p:ext uri="{BB962C8B-B14F-4D97-AF65-F5344CB8AC3E}">
-        <p14:creationId xmlns:p14="http://schemas.microsoft.com/office/powerpoint/2010/main" val="2672617673"/>
+        <p14:creationId xmlns:p14="http://schemas.microsoft.com/office/powerpoint/2010/main" val="3378820196"/>
       </p:ext>
     </p:extLst>
   </p:cSld>
@@ -5404,4 +7049,299 @@
     </a:ext>
   </a:extLst>
 </a:theme>
+</file>
+
+<file path=ppt/theme/theme2.xml><?xml version="1.0" encoding="utf-8"?>
+<a:theme xmlns:a="http://schemas.openxmlformats.org/drawingml/2006/main" name="Thème Office 2013 – 2022">
+  <a:themeElements>
+    <a:clrScheme name="Office">
+      <a:dk1>
+        <a:sysClr val="windowText" lastClr="000000"/>
+      </a:dk1>
+      <a:lt1>
+        <a:sysClr val="window" lastClr="FFFFFF"/>
+      </a:lt1>
+      <a:dk2>
+        <a:srgbClr val="44546A"/>
+      </a:dk2>
+      <a:lt2>
+        <a:srgbClr val="E7E6E6"/>
+      </a:lt2>
+      <a:accent1>
+        <a:srgbClr val="4472C4"/>
+      </a:accent1>
+      <a:accent2>
+        <a:srgbClr val="ED7D31"/>
+      </a:accent2>
+      <a:accent3>
+        <a:srgbClr val="A5A5A5"/>
+      </a:accent3>
+      <a:accent4>
+        <a:srgbClr val="FFC000"/>
+      </a:accent4>
+      <a:accent5>
+        <a:srgbClr val="5B9BD5"/>
+      </a:accent5>
+      <a:accent6>
+        <a:srgbClr val="70AD47"/>
+      </a:accent6>
+      <a:hlink>
+        <a:srgbClr val="0563C1"/>
+      </a:hlink>
+      <a:folHlink>
+        <a:srgbClr val="954F72"/>
+      </a:folHlink>
+    </a:clrScheme>
+    <a:fontScheme name="Office">
+      <a:majorFont>
+        <a:latin typeface="Calibri Light" panose="020F0302020204030204"/>
+        <a:ea typeface=""/>
+        <a:cs typeface=""/>
+        <a:font script="Jpan" typeface="游ゴシック Light"/>
+        <a:font script="Hang" typeface="맑은 고딕"/>
+        <a:font script="Hans" typeface="等线 Light"/>
+        <a:font script="Hant" typeface="新細明體"/>
+        <a:font script="Arab" typeface="Times New Roman"/>
+        <a:font script="Hebr" typeface="Times New Roman"/>
+        <a:font script="Thai" typeface="Angsana New"/>
+        <a:font script="Ethi" typeface="Nyala"/>
+        <a:font script="Beng" typeface="Vrinda"/>
+        <a:font script="Gujr" typeface="Shruti"/>
+        <a:font script="Khmr" typeface="MoolBoran"/>
+        <a:font script="Knda" typeface="Tunga"/>
+        <a:font script="Guru" typeface="Raavi"/>
+        <a:font script="Cans" typeface="Euphemia"/>
+        <a:font script="Cher" typeface="Plantagenet Cherokee"/>
+        <a:font script="Yiii" typeface="Microsoft Yi Baiti"/>
+        <a:font script="Tibt" typeface="Microsoft Himalaya"/>
+        <a:font script="Thaa" typeface="MV Boli"/>
+        <a:font script="Deva" typeface="Mangal"/>
+        <a:font script="Telu" typeface="Gautami"/>
+        <a:font script="Taml" typeface="Latha"/>
+        <a:font script="Syrc" typeface="Estrangelo Edessa"/>
+        <a:font script="Orya" typeface="Kalinga"/>
+        <a:font script="Mlym" typeface="Kartika"/>
+        <a:font script="Laoo" typeface="DokChampa"/>
+        <a:font script="Sinh" typeface="Iskoola Pota"/>
+        <a:font script="Mong" typeface="Mongolian Baiti"/>
+        <a:font script="Viet" typeface="Times New Roman"/>
+        <a:font script="Uigh" typeface="Microsoft Uighur"/>
+        <a:font script="Geor" typeface="Sylfaen"/>
+        <a:font script="Armn" typeface="Arial"/>
+        <a:font script="Bugi" typeface="Leelawadee UI"/>
+        <a:font script="Bopo" typeface="Microsoft JhengHei"/>
+        <a:font script="Java" typeface="Javanese Text"/>
+        <a:font script="Lisu" typeface="Segoe UI"/>
+        <a:font script="Mymr" typeface="Myanmar Text"/>
+        <a:font script="Nkoo" typeface="Ebrima"/>
+        <a:font script="Olck" typeface="Nirmala UI"/>
+        <a:font script="Osma" typeface="Ebrima"/>
+        <a:font script="Phag" typeface="Phagspa"/>
+        <a:font script="Syrn" typeface="Estrangelo Edessa"/>
+        <a:font script="Syrj" typeface="Estrangelo Edessa"/>
+        <a:font script="Syre" typeface="Estrangelo Edessa"/>
+        <a:font script="Sora" typeface="Nirmala UI"/>
+        <a:font script="Tale" typeface="Microsoft Tai Le"/>
+        <a:font script="Talu" typeface="Microsoft New Tai Lue"/>
+        <a:font script="Tfng" typeface="Ebrima"/>
+      </a:majorFont>
+      <a:minorFont>
+        <a:latin typeface="Calibri" panose="020F0502020204030204"/>
+        <a:ea typeface=""/>
+        <a:cs typeface=""/>
+        <a:font script="Jpan" typeface="游ゴシック"/>
+        <a:font script="Hang" typeface="맑은 고딕"/>
+        <a:font script="Hans" typeface="等线"/>
+        <a:font script="Hant" typeface="新細明體"/>
+        <a:font script="Arab" typeface="Arial"/>
+        <a:font script="Hebr" typeface="Arial"/>
+        <a:font script="Thai" typeface="Cordia New"/>
+        <a:font script="Ethi" typeface="Nyala"/>
+        <a:font script="Beng" typeface="Vrinda"/>
+        <a:font script="Gujr" typeface="Shruti"/>
+        <a:font script="Khmr" typeface="DaunPenh"/>
+        <a:font script="Knda" typeface="Tunga"/>
+        <a:font script="Guru" typeface="Raavi"/>
+        <a:font script="Cans" typeface="Euphemia"/>
+        <a:font script="Cher" typeface="Plantagenet Cherokee"/>
+        <a:font script="Yiii" typeface="Microsoft Yi Baiti"/>
+        <a:font script="Tibt" typeface="Microsoft Himalaya"/>
+        <a:font script="Thaa" typeface="MV Boli"/>
+        <a:font script="Deva" typeface="Mangal"/>
+        <a:font script="Telu" typeface="Gautami"/>
+        <a:font script="Taml" typeface="Latha"/>
+        <a:font script="Syrc" typeface="Estrangelo Edessa"/>
+        <a:font script="Orya" typeface="Kalinga"/>
+        <a:font script="Mlym" typeface="Kartika"/>
+        <a:font script="Laoo" typeface="DokChampa"/>
+        <a:font script="Sinh" typeface="Iskoola Pota"/>
+        <a:font script="Mong" typeface="Mongolian Baiti"/>
+        <a:font script="Viet" typeface="Arial"/>
+        <a:font script="Uigh" typeface="Microsoft Uighur"/>
+        <a:font script="Geor" typeface="Sylfaen"/>
+        <a:font script="Armn" typeface="Arial"/>
+        <a:font script="Bugi" typeface="Leelawadee UI"/>
+        <a:font script="Bopo" typeface="Microsoft JhengHei"/>
+        <a:font script="Java" typeface="Javanese Text"/>
+        <a:font script="Lisu" typeface="Segoe UI"/>
+        <a:font script="Mymr" typeface="Myanmar Text"/>
+        <a:font script="Nkoo" typeface="Ebrima"/>
+        <a:font script="Olck" typeface="Nirmala UI"/>
+        <a:font script="Osma" typeface="Ebrima"/>
+        <a:font script="Phag" typeface="Phagspa"/>
+        <a:font script="Syrn" typeface="Estrangelo Edessa"/>
+        <a:font script="Syrj" typeface="Estrangelo Edessa"/>
+        <a:font script="Syre" typeface="Estrangelo Edessa"/>
+        <a:font script="Sora" typeface="Nirmala UI"/>
+        <a:font script="Tale" typeface="Microsoft Tai Le"/>
+        <a:font script="Talu" typeface="Microsoft New Tai Lue"/>
+        <a:font script="Tfng" typeface="Ebrima"/>
+      </a:minorFont>
+    </a:fontScheme>
+    <a:fmtScheme name="Office">
+      <a:fillStyleLst>
+        <a:solidFill>
+          <a:schemeClr val="phClr"/>
+        </a:solidFill>
+        <a:gradFill rotWithShape="1">
+          <a:gsLst>
+            <a:gs pos="0">
+              <a:schemeClr val="phClr">
+                <a:lumMod val="110000"/>
+                <a:satMod val="105000"/>
+                <a:tint val="67000"/>
+              </a:schemeClr>
+            </a:gs>
+            <a:gs pos="50000">
+              <a:schemeClr val="phClr">
+                <a:lumMod val="105000"/>
+                <a:satMod val="103000"/>
+                <a:tint val="73000"/>
+              </a:schemeClr>
+            </a:gs>
+            <a:gs pos="100000">
+              <a:schemeClr val="phClr">
+                <a:lumMod val="105000"/>
+                <a:satMod val="109000"/>
+                <a:tint val="81000"/>
+              </a:schemeClr>
+            </a:gs>
+          </a:gsLst>
+          <a:lin ang="5400000" scaled="0"/>
+        </a:gradFill>
+        <a:gradFill rotWithShape="1">
+          <a:gsLst>
+            <a:gs pos="0">
+              <a:schemeClr val="phClr">
+                <a:satMod val="103000"/>
+                <a:lumMod val="102000"/>
+                <a:tint val="94000"/>
+              </a:schemeClr>
+            </a:gs>
+            <a:gs pos="50000">
+              <a:schemeClr val="phClr">
+                <a:satMod val="110000"/>
+                <a:lumMod val="100000"/>
+                <a:shade val="100000"/>
+              </a:schemeClr>
+            </a:gs>
+            <a:gs pos="100000">
+              <a:schemeClr val="phClr">
+                <a:lumMod val="99000"/>
+                <a:satMod val="120000"/>
+                <a:shade val="78000"/>
+              </a:schemeClr>
+            </a:gs>
+          </a:gsLst>
+          <a:lin ang="5400000" scaled="0"/>
+        </a:gradFill>
+      </a:fillStyleLst>
+      <a:lnStyleLst>
+        <a:ln w="6350" cap="flat" cmpd="sng" algn="ctr">
+          <a:solidFill>
+            <a:schemeClr val="phClr"/>
+          </a:solidFill>
+          <a:prstDash val="solid"/>
+          <a:miter lim="800000"/>
+        </a:ln>
+        <a:ln w="12700" cap="flat" cmpd="sng" algn="ctr">
+          <a:solidFill>
+            <a:schemeClr val="phClr"/>
+          </a:solidFill>
+          <a:prstDash val="solid"/>
+          <a:miter lim="800000"/>
+        </a:ln>
+        <a:ln w="19050" cap="flat" cmpd="sng" algn="ctr">
+          <a:solidFill>
+            <a:schemeClr val="phClr"/>
+          </a:solidFill>
+          <a:prstDash val="solid"/>
+          <a:miter lim="800000"/>
+        </a:ln>
+      </a:lnStyleLst>
+      <a:effectStyleLst>
+        <a:effectStyle>
+          <a:effectLst/>
+        </a:effectStyle>
+        <a:effectStyle>
+          <a:effectLst/>
+        </a:effectStyle>
+        <a:effectStyle>
+          <a:effectLst>
+            <a:outerShdw blurRad="57150" dist="19050" dir="5400000" algn="ctr" rotWithShape="0">
+              <a:srgbClr val="000000">
+                <a:alpha val="63000"/>
+              </a:srgbClr>
+            </a:outerShdw>
+          </a:effectLst>
+        </a:effectStyle>
+      </a:effectStyleLst>
+      <a:bgFillStyleLst>
+        <a:solidFill>
+          <a:schemeClr val="phClr"/>
+        </a:solidFill>
+        <a:solidFill>
+          <a:schemeClr val="phClr">
+            <a:tint val="95000"/>
+            <a:satMod val="170000"/>
+          </a:schemeClr>
+        </a:solidFill>
+        <a:gradFill rotWithShape="1">
+          <a:gsLst>
+            <a:gs pos="0">
+              <a:schemeClr val="phClr">
+                <a:tint val="93000"/>
+                <a:satMod val="150000"/>
+                <a:shade val="98000"/>
+                <a:lumMod val="102000"/>
+              </a:schemeClr>
+            </a:gs>
+            <a:gs pos="50000">
+              <a:schemeClr val="phClr">
+                <a:tint val="98000"/>
+                <a:satMod val="130000"/>
+                <a:shade val="90000"/>
+                <a:lumMod val="103000"/>
+              </a:schemeClr>
+            </a:gs>
+            <a:gs pos="100000">
+              <a:schemeClr val="phClr">
+                <a:shade val="63000"/>
+                <a:satMod val="120000"/>
+              </a:schemeClr>
+            </a:gs>
+          </a:gsLst>
+          <a:lin ang="5400000" scaled="0"/>
+        </a:gradFill>
+      </a:bgFillStyleLst>
+    </a:fmtScheme>
+  </a:themeElements>
+  <a:objectDefaults/>
+  <a:extraClrSchemeLst/>
+  <a:extLst>
+    <a:ext uri="{05A4C25C-085E-4340-85A3-A5531E510DB2}">
+      <thm15:themeFamily xmlns:thm15="http://schemas.microsoft.com/office/thememl/2012/main" name="Office Theme 2013 - 2022" id="{62F939B6-93AF-4DB8-9C6B-D6C7DFDC589F}" vid="{4A3C46E8-61CC-4603-A589-7422A47A8E4A}"/>
+    </a:ext>
+  </a:extLst>
+</a:theme>
 </file>
</xml_diff>